<commit_message>
Add account setup, GitHub GUI
</commit_message>
<xml_diff>
--- a/_episodes/R-ladies/2021-04-16_git.GUI.pptx
+++ b/_episodes/R-ladies/2021-04-16_git.GUI.pptx
@@ -5,25 +5,24 @@
     <p:sldMasterId id="2147483648" r:id="rId1"/>
   </p:sldMasterIdLst>
   <p:notesMasterIdLst>
-    <p:notesMasterId r:id="rId18"/>
+    <p:notesMasterId r:id="rId17"/>
   </p:notesMasterIdLst>
   <p:sldIdLst>
     <p:sldId id="256" r:id="rId2"/>
-    <p:sldId id="280" r:id="rId3"/>
-    <p:sldId id="297" r:id="rId4"/>
-    <p:sldId id="282" r:id="rId5"/>
-    <p:sldId id="281" r:id="rId6"/>
-    <p:sldId id="283" r:id="rId7"/>
-    <p:sldId id="288" r:id="rId8"/>
-    <p:sldId id="285" r:id="rId9"/>
-    <p:sldId id="284" r:id="rId10"/>
-    <p:sldId id="289" r:id="rId11"/>
-    <p:sldId id="264" r:id="rId12"/>
-    <p:sldId id="267" r:id="rId13"/>
-    <p:sldId id="293" r:id="rId14"/>
-    <p:sldId id="294" r:id="rId15"/>
-    <p:sldId id="296" r:id="rId16"/>
-    <p:sldId id="295" r:id="rId17"/>
+    <p:sldId id="298" r:id="rId3"/>
+    <p:sldId id="299" r:id="rId4"/>
+    <p:sldId id="280" r:id="rId5"/>
+    <p:sldId id="297" r:id="rId6"/>
+    <p:sldId id="282" r:id="rId7"/>
+    <p:sldId id="281" r:id="rId8"/>
+    <p:sldId id="283" r:id="rId9"/>
+    <p:sldId id="288" r:id="rId10"/>
+    <p:sldId id="285" r:id="rId11"/>
+    <p:sldId id="284" r:id="rId12"/>
+    <p:sldId id="289" r:id="rId13"/>
+    <p:sldId id="264" r:id="rId14"/>
+    <p:sldId id="267" r:id="rId15"/>
+    <p:sldId id="293" r:id="rId16"/>
   </p:sldIdLst>
   <p:sldSz cx="12192000" cy="6858000"/>
   <p:notesSz cx="6858000" cy="9144000"/>
@@ -212,7 +211,7 @@
           <a:p>
             <a:fld id="{4B463ACF-AABD-2347-8593-F47F3F52EA6C}" type="datetimeFigureOut">
               <a:rPr lang="en-US" smtClean="0"/>
-              <a:t>3/25/21</a:t>
+              <a:t>4/15/21</a:t>
             </a:fld>
             <a:endParaRPr lang="en-US"/>
           </a:p>
@@ -544,7 +543,7 @@
           <a:p>
             <a:fld id="{7149579C-B5E8-0E42-854A-0AA7B389972E}" type="slidenum">
               <a:rPr lang="en-US" smtClean="0"/>
-              <a:t>11</a:t>
+              <a:t>13</a:t>
             </a:fld>
             <a:endParaRPr lang="en-US"/>
           </a:p>
@@ -710,7 +709,7 @@
           <a:p>
             <a:fld id="{2B629413-320D-E445-A798-09CF28AB75D4}" type="datetimeFigureOut">
               <a:rPr lang="en-US" smtClean="0"/>
-              <a:t>3/25/21</a:t>
+              <a:t>4/15/21</a:t>
             </a:fld>
             <a:endParaRPr lang="en-US"/>
           </a:p>
@@ -908,7 +907,7 @@
           <a:p>
             <a:fld id="{2B629413-320D-E445-A798-09CF28AB75D4}" type="datetimeFigureOut">
               <a:rPr lang="en-US" smtClean="0"/>
-              <a:t>3/25/21</a:t>
+              <a:t>4/15/21</a:t>
             </a:fld>
             <a:endParaRPr lang="en-US"/>
           </a:p>
@@ -1116,7 +1115,7 @@
           <a:p>
             <a:fld id="{2B629413-320D-E445-A798-09CF28AB75D4}" type="datetimeFigureOut">
               <a:rPr lang="en-US" smtClean="0"/>
-              <a:t>3/25/21</a:t>
+              <a:t>4/15/21</a:t>
             </a:fld>
             <a:endParaRPr lang="en-US"/>
           </a:p>
@@ -1314,7 +1313,7 @@
           <a:p>
             <a:fld id="{2B629413-320D-E445-A798-09CF28AB75D4}" type="datetimeFigureOut">
               <a:rPr lang="en-US" smtClean="0"/>
-              <a:t>3/25/21</a:t>
+              <a:t>4/15/21</a:t>
             </a:fld>
             <a:endParaRPr lang="en-US"/>
           </a:p>
@@ -1589,7 +1588,7 @@
           <a:p>
             <a:fld id="{2B629413-320D-E445-A798-09CF28AB75D4}" type="datetimeFigureOut">
               <a:rPr lang="en-US" smtClean="0"/>
-              <a:t>3/25/21</a:t>
+              <a:t>4/15/21</a:t>
             </a:fld>
             <a:endParaRPr lang="en-US"/>
           </a:p>
@@ -1854,7 +1853,7 @@
           <a:p>
             <a:fld id="{2B629413-320D-E445-A798-09CF28AB75D4}" type="datetimeFigureOut">
               <a:rPr lang="en-US" smtClean="0"/>
-              <a:t>3/25/21</a:t>
+              <a:t>4/15/21</a:t>
             </a:fld>
             <a:endParaRPr lang="en-US"/>
           </a:p>
@@ -2266,7 +2265,7 @@
           <a:p>
             <a:fld id="{2B629413-320D-E445-A798-09CF28AB75D4}" type="datetimeFigureOut">
               <a:rPr lang="en-US" smtClean="0"/>
-              <a:t>3/25/21</a:t>
+              <a:t>4/15/21</a:t>
             </a:fld>
             <a:endParaRPr lang="en-US"/>
           </a:p>
@@ -2407,7 +2406,7 @@
           <a:p>
             <a:fld id="{2B629413-320D-E445-A798-09CF28AB75D4}" type="datetimeFigureOut">
               <a:rPr lang="en-US" smtClean="0"/>
-              <a:t>3/25/21</a:t>
+              <a:t>4/15/21</a:t>
             </a:fld>
             <a:endParaRPr lang="en-US"/>
           </a:p>
@@ -2520,7 +2519,7 @@
           <a:p>
             <a:fld id="{2B629413-320D-E445-A798-09CF28AB75D4}" type="datetimeFigureOut">
               <a:rPr lang="en-US" smtClean="0"/>
-              <a:t>3/25/21</a:t>
+              <a:t>4/15/21</a:t>
             </a:fld>
             <a:endParaRPr lang="en-US"/>
           </a:p>
@@ -2831,7 +2830,7 @@
           <a:p>
             <a:fld id="{2B629413-320D-E445-A798-09CF28AB75D4}" type="datetimeFigureOut">
               <a:rPr lang="en-US" smtClean="0"/>
-              <a:t>3/25/21</a:t>
+              <a:t>4/15/21</a:t>
             </a:fld>
             <a:endParaRPr lang="en-US"/>
           </a:p>
@@ -3119,7 +3118,7 @@
           <a:p>
             <a:fld id="{2B629413-320D-E445-A798-09CF28AB75D4}" type="datetimeFigureOut">
               <a:rPr lang="en-US" smtClean="0"/>
-              <a:t>3/25/21</a:t>
+              <a:t>4/15/21</a:t>
             </a:fld>
             <a:endParaRPr lang="en-US"/>
           </a:p>
@@ -3360,7 +3359,7 @@
           <a:p>
             <a:fld id="{2B629413-320D-E445-A798-09CF28AB75D4}" type="datetimeFigureOut">
               <a:rPr lang="en-US" smtClean="0"/>
-              <a:t>3/25/21</a:t>
+              <a:t>4/15/21</a:t>
             </a:fld>
             <a:endParaRPr lang="en-US"/>
           </a:p>
@@ -3914,6 +3913,435 @@
           <p:cNvPr id="2" name="Title 1">
             <a:extLst>
               <a:ext uri="{FF2B5EF4-FFF2-40B4-BE49-F238E27FC236}">
+                <a16:creationId xmlns:a16="http://schemas.microsoft.com/office/drawing/2014/main" id="{209B4A58-19B9-2346-A1F8-D57355C7BC8B}"/>
+              </a:ext>
+            </a:extLst>
+          </p:cNvPr>
+          <p:cNvSpPr>
+            <a:spLocks noGrp="1"/>
+          </p:cNvSpPr>
+          <p:nvPr>
+            <p:ph type="title"/>
+          </p:nvPr>
+        </p:nvSpPr>
+        <p:spPr/>
+        <p:txBody>
+          <a:bodyPr/>
+          <a:lstStyle/>
+          <a:p>
+            <a:r>
+              <a:rPr lang="en-US" dirty="0"/>
+              <a:t>View complete history</a:t>
+            </a:r>
+          </a:p>
+        </p:txBody>
+      </p:sp>
+      <p:pic>
+        <p:nvPicPr>
+          <p:cNvPr id="6" name="Content Placeholder 5">
+            <a:extLst>
+              <a:ext uri="{FF2B5EF4-FFF2-40B4-BE49-F238E27FC236}">
+                <a16:creationId xmlns:a16="http://schemas.microsoft.com/office/drawing/2014/main" id="{062676E6-2972-FE44-B7FF-311A8007F4AB}"/>
+              </a:ext>
+            </a:extLst>
+          </p:cNvPr>
+          <p:cNvPicPr>
+            <a:picLocks noGrp="1" noChangeAspect="1"/>
+          </p:cNvPicPr>
+          <p:nvPr>
+            <p:ph idx="1"/>
+          </p:nvPr>
+        </p:nvPicPr>
+        <p:blipFill>
+          <a:blip r:embed="rId2"/>
+          <a:stretch>
+            <a:fillRect/>
+          </a:stretch>
+        </p:blipFill>
+        <p:spPr>
+          <a:xfrm>
+            <a:off x="838200" y="2217665"/>
+            <a:ext cx="10515600" cy="2422669"/>
+          </a:xfrm>
+        </p:spPr>
+      </p:pic>
+      <p:sp>
+        <p:nvSpPr>
+          <p:cNvPr id="4" name="TextBox 3">
+            <a:extLst>
+              <a:ext uri="{FF2B5EF4-FFF2-40B4-BE49-F238E27FC236}">
+                <a16:creationId xmlns:a16="http://schemas.microsoft.com/office/drawing/2014/main" id="{0F68332A-508A-E847-B82F-E7062B8FF7C9}"/>
+              </a:ext>
+            </a:extLst>
+          </p:cNvPr>
+          <p:cNvSpPr txBox="1"/>
+          <p:nvPr/>
+        </p:nvSpPr>
+        <p:spPr>
+          <a:xfrm>
+            <a:off x="0" y="6488668"/>
+            <a:ext cx="12192000" cy="369332"/>
+          </a:xfrm>
+          <a:prstGeom prst="rect">
+            <a:avLst/>
+          </a:prstGeom>
+          <a:noFill/>
+        </p:spPr>
+        <p:txBody>
+          <a:bodyPr wrap="square" rtlCol="0">
+            <a:spAutoFit/>
+          </a:bodyPr>
+          <a:lstStyle/>
+          <a:p>
+            <a:pPr algn="ctr"/>
+            <a:r>
+              <a:rPr lang="en-US" dirty="0" err="1"/>
+              <a:t>kadm@uw.edu</a:t>
+            </a:r>
+            <a:r>
+              <a:rPr lang="en-US" dirty="0"/>
+              <a:t>	@</a:t>
+            </a:r>
+            <a:r>
+              <a:rPr lang="en-US" dirty="0" err="1"/>
+              <a:t>kdillmcfarland</a:t>
+            </a:r>
+            <a:r>
+              <a:rPr lang="en-US" dirty="0"/>
+              <a:t>						Slides </a:t>
+            </a:r>
+            <a:r>
+              <a:rPr lang="en-US" dirty="0">
+                <a:hlinkClick r:id="rId3"/>
+              </a:rPr>
+              <a:t>https://tinyurl.com/4zsqs2rd</a:t>
+            </a:r>
+            <a:r>
+              <a:rPr lang="en-US" dirty="0"/>
+              <a:t> </a:t>
+            </a:r>
+          </a:p>
+        </p:txBody>
+      </p:sp>
+      <p:sp>
+        <p:nvSpPr>
+          <p:cNvPr id="7" name="Down Arrow 6">
+            <a:extLst>
+              <a:ext uri="{FF2B5EF4-FFF2-40B4-BE49-F238E27FC236}">
+                <a16:creationId xmlns:a16="http://schemas.microsoft.com/office/drawing/2014/main" id="{239A5821-830F-9647-8075-3E51BB77E3EA}"/>
+              </a:ext>
+            </a:extLst>
+          </p:cNvPr>
+          <p:cNvSpPr/>
+          <p:nvPr/>
+        </p:nvSpPr>
+        <p:spPr>
+          <a:xfrm>
+            <a:off x="3891776" y="1622395"/>
+            <a:ext cx="289931" cy="992459"/>
+          </a:xfrm>
+          <a:prstGeom prst="downArrow">
+            <a:avLst/>
+          </a:prstGeom>
+          <a:solidFill>
+            <a:srgbClr val="C00000"/>
+          </a:solidFill>
+          <a:ln>
+            <a:solidFill>
+              <a:srgbClr val="C00000"/>
+            </a:solidFill>
+          </a:ln>
+        </p:spPr>
+        <p:style>
+          <a:lnRef idx="2">
+            <a:schemeClr val="accent1">
+              <a:shade val="50000"/>
+            </a:schemeClr>
+          </a:lnRef>
+          <a:fillRef idx="1">
+            <a:schemeClr val="accent1"/>
+          </a:fillRef>
+          <a:effectRef idx="0">
+            <a:schemeClr val="accent1"/>
+          </a:effectRef>
+          <a:fontRef idx="minor">
+            <a:schemeClr val="lt1"/>
+          </a:fontRef>
+        </p:style>
+        <p:txBody>
+          <a:bodyPr rtlCol="0" anchor="ctr"/>
+          <a:lstStyle/>
+          <a:p>
+            <a:pPr algn="ctr"/>
+            <a:endParaRPr lang="en-US"/>
+          </a:p>
+        </p:txBody>
+      </p:sp>
+    </p:spTree>
+    <p:extLst>
+      <p:ext uri="{BB962C8B-B14F-4D97-AF65-F5344CB8AC3E}">
+        <p14:creationId xmlns:p14="http://schemas.microsoft.com/office/powerpoint/2010/main" val="632464153"/>
+      </p:ext>
+    </p:extLst>
+  </p:cSld>
+  <p:clrMapOvr>
+    <a:masterClrMapping/>
+  </p:clrMapOvr>
+</p:sld>
+</file>
+
+<file path=ppt/slides/slide11.xml><?xml version="1.0" encoding="utf-8"?>
+<p:sld xmlns:a="http://schemas.openxmlformats.org/drawingml/2006/main" xmlns:r="http://schemas.openxmlformats.org/officeDocument/2006/relationships" xmlns:p="http://schemas.openxmlformats.org/presentationml/2006/main">
+  <p:cSld>
+    <p:spTree>
+      <p:nvGrpSpPr>
+        <p:cNvPr id="1" name=""/>
+        <p:cNvGrpSpPr/>
+        <p:nvPr/>
+      </p:nvGrpSpPr>
+      <p:grpSpPr>
+        <a:xfrm>
+          <a:off x="0" y="0"/>
+          <a:ext cx="0" cy="0"/>
+          <a:chOff x="0" y="0"/>
+          <a:chExt cx="0" cy="0"/>
+        </a:xfrm>
+      </p:grpSpPr>
+      <p:sp>
+        <p:nvSpPr>
+          <p:cNvPr id="2" name="Title 1">
+            <a:extLst>
+              <a:ext uri="{FF2B5EF4-FFF2-40B4-BE49-F238E27FC236}">
+                <a16:creationId xmlns:a16="http://schemas.microsoft.com/office/drawing/2014/main" id="{209B4A58-19B9-2346-A1F8-D57355C7BC8B}"/>
+              </a:ext>
+            </a:extLst>
+          </p:cNvPr>
+          <p:cNvSpPr>
+            <a:spLocks noGrp="1"/>
+          </p:cNvSpPr>
+          <p:nvPr>
+            <p:ph type="title"/>
+          </p:nvPr>
+        </p:nvSpPr>
+        <p:spPr/>
+        <p:txBody>
+          <a:bodyPr/>
+          <a:lstStyle/>
+          <a:p>
+            <a:r>
+              <a:rPr lang="en-US" dirty="0"/>
+              <a:t>Revert back to old versions</a:t>
+            </a:r>
+          </a:p>
+        </p:txBody>
+      </p:sp>
+      <p:pic>
+        <p:nvPicPr>
+          <p:cNvPr id="6" name="Content Placeholder 5">
+            <a:extLst>
+              <a:ext uri="{FF2B5EF4-FFF2-40B4-BE49-F238E27FC236}">
+                <a16:creationId xmlns:a16="http://schemas.microsoft.com/office/drawing/2014/main" id="{28C092CB-C076-D846-BA94-11966F3BB57A}"/>
+              </a:ext>
+            </a:extLst>
+          </p:cNvPr>
+          <p:cNvPicPr>
+            <a:picLocks noGrp="1" noChangeAspect="1"/>
+          </p:cNvPicPr>
+          <p:nvPr>
+            <p:ph idx="1"/>
+          </p:nvPr>
+        </p:nvPicPr>
+        <p:blipFill>
+          <a:blip r:embed="rId2"/>
+          <a:stretch>
+            <a:fillRect/>
+          </a:stretch>
+        </p:blipFill>
+        <p:spPr>
+          <a:xfrm>
+            <a:off x="2959100" y="1792424"/>
+            <a:ext cx="6273800" cy="4038600"/>
+          </a:xfrm>
+        </p:spPr>
+      </p:pic>
+      <p:sp>
+        <p:nvSpPr>
+          <p:cNvPr id="7" name="Down Arrow 6">
+            <a:extLst>
+              <a:ext uri="{FF2B5EF4-FFF2-40B4-BE49-F238E27FC236}">
+                <a16:creationId xmlns:a16="http://schemas.microsoft.com/office/drawing/2014/main" id="{CD16FDAC-94E9-E240-AA2D-DFB0E6AF7707}"/>
+              </a:ext>
+            </a:extLst>
+          </p:cNvPr>
+          <p:cNvSpPr/>
+          <p:nvPr/>
+        </p:nvSpPr>
+        <p:spPr>
+          <a:xfrm>
+            <a:off x="7515922" y="1355873"/>
+            <a:ext cx="289931" cy="992459"/>
+          </a:xfrm>
+          <a:prstGeom prst="downArrow">
+            <a:avLst/>
+          </a:prstGeom>
+          <a:solidFill>
+            <a:srgbClr val="C00000"/>
+          </a:solidFill>
+          <a:ln>
+            <a:solidFill>
+              <a:srgbClr val="C00000"/>
+            </a:solidFill>
+          </a:ln>
+        </p:spPr>
+        <p:style>
+          <a:lnRef idx="2">
+            <a:schemeClr val="accent1">
+              <a:shade val="50000"/>
+            </a:schemeClr>
+          </a:lnRef>
+          <a:fillRef idx="1">
+            <a:schemeClr val="accent1"/>
+          </a:fillRef>
+          <a:effectRef idx="0">
+            <a:schemeClr val="accent1"/>
+          </a:effectRef>
+          <a:fontRef idx="minor">
+            <a:schemeClr val="lt1"/>
+          </a:fontRef>
+        </p:style>
+        <p:txBody>
+          <a:bodyPr rtlCol="0" anchor="ctr"/>
+          <a:lstStyle/>
+          <a:p>
+            <a:pPr algn="ctr"/>
+            <a:endParaRPr lang="en-US"/>
+          </a:p>
+        </p:txBody>
+      </p:sp>
+      <p:sp>
+        <p:nvSpPr>
+          <p:cNvPr id="8" name="Down Arrow 7">
+            <a:extLst>
+              <a:ext uri="{FF2B5EF4-FFF2-40B4-BE49-F238E27FC236}">
+                <a16:creationId xmlns:a16="http://schemas.microsoft.com/office/drawing/2014/main" id="{BA1C8CAC-4974-A241-A865-184394AE832D}"/>
+              </a:ext>
+            </a:extLst>
+          </p:cNvPr>
+          <p:cNvSpPr/>
+          <p:nvPr/>
+        </p:nvSpPr>
+        <p:spPr>
+          <a:xfrm rot="5400000">
+            <a:off x="9188605" y="3763429"/>
+            <a:ext cx="289931" cy="992459"/>
+          </a:xfrm>
+          <a:prstGeom prst="downArrow">
+            <a:avLst/>
+          </a:prstGeom>
+          <a:solidFill>
+            <a:srgbClr val="C00000"/>
+          </a:solidFill>
+          <a:ln>
+            <a:solidFill>
+              <a:srgbClr val="C00000"/>
+            </a:solidFill>
+          </a:ln>
+        </p:spPr>
+        <p:style>
+          <a:lnRef idx="2">
+            <a:schemeClr val="accent1">
+              <a:shade val="50000"/>
+            </a:schemeClr>
+          </a:lnRef>
+          <a:fillRef idx="1">
+            <a:schemeClr val="accent1"/>
+          </a:fillRef>
+          <a:effectRef idx="0">
+            <a:schemeClr val="accent1"/>
+          </a:effectRef>
+          <a:fontRef idx="minor">
+            <a:schemeClr val="lt1"/>
+          </a:fontRef>
+        </p:style>
+        <p:txBody>
+          <a:bodyPr rtlCol="0" anchor="ctr"/>
+          <a:lstStyle/>
+          <a:p>
+            <a:pPr algn="ctr"/>
+            <a:endParaRPr lang="en-US"/>
+          </a:p>
+        </p:txBody>
+      </p:sp>
+      <p:sp>
+        <p:nvSpPr>
+          <p:cNvPr id="9" name="TextBox 8">
+            <a:extLst>
+              <a:ext uri="{FF2B5EF4-FFF2-40B4-BE49-F238E27FC236}">
+                <a16:creationId xmlns:a16="http://schemas.microsoft.com/office/drawing/2014/main" id="{EFFADD3C-9347-F04D-BFBC-3487E04B6638}"/>
+              </a:ext>
+            </a:extLst>
+          </p:cNvPr>
+          <p:cNvSpPr txBox="1"/>
+          <p:nvPr/>
+        </p:nvSpPr>
+        <p:spPr>
+          <a:xfrm>
+            <a:off x="9829800" y="4081133"/>
+            <a:ext cx="1137234" cy="369332"/>
+          </a:xfrm>
+          <a:prstGeom prst="rect">
+            <a:avLst/>
+          </a:prstGeom>
+          <a:noFill/>
+        </p:spPr>
+        <p:txBody>
+          <a:bodyPr wrap="none" rtlCol="0">
+            <a:spAutoFit/>
+          </a:bodyPr>
+          <a:lstStyle/>
+          <a:p>
+            <a:r>
+              <a:rPr lang="en-US" dirty="0"/>
+              <a:t>Right-click</a:t>
+            </a:r>
+          </a:p>
+        </p:txBody>
+      </p:sp>
+    </p:spTree>
+    <p:extLst>
+      <p:ext uri="{BB962C8B-B14F-4D97-AF65-F5344CB8AC3E}">
+        <p14:creationId xmlns:p14="http://schemas.microsoft.com/office/powerpoint/2010/main" val="1976229122"/>
+      </p:ext>
+    </p:extLst>
+  </p:cSld>
+  <p:clrMapOvr>
+    <a:masterClrMapping/>
+  </p:clrMapOvr>
+</p:sld>
+</file>
+
+<file path=ppt/slides/slide12.xml><?xml version="1.0" encoding="utf-8"?>
+<p:sld xmlns:a="http://schemas.openxmlformats.org/drawingml/2006/main" xmlns:r="http://schemas.openxmlformats.org/officeDocument/2006/relationships" xmlns:p="http://schemas.openxmlformats.org/presentationml/2006/main">
+  <p:cSld>
+    <p:spTree>
+      <p:nvGrpSpPr>
+        <p:cNvPr id="1" name=""/>
+        <p:cNvGrpSpPr/>
+        <p:nvPr/>
+      </p:nvGrpSpPr>
+      <p:grpSpPr>
+        <a:xfrm>
+          <a:off x="0" y="0"/>
+          <a:ext cx="0" cy="0"/>
+          <a:chOff x="0" y="0"/>
+          <a:chExt cx="0" cy="0"/>
+        </a:xfrm>
+      </p:grpSpPr>
+      <p:sp>
+        <p:nvSpPr>
+          <p:cNvPr id="2" name="Title 1">
+            <a:extLst>
+              <a:ext uri="{FF2B5EF4-FFF2-40B4-BE49-F238E27FC236}">
                 <a16:creationId xmlns:a16="http://schemas.microsoft.com/office/drawing/2014/main" id="{DD80D402-4B0A-DA49-B9D3-BCE9C075E7F8}"/>
               </a:ext>
             </a:extLst>
@@ -3978,7 +4406,7 @@
 </p:sld>
 </file>
 
-<file path=ppt/slides/slide11.xml><?xml version="1.0" encoding="utf-8"?>
+<file path=ppt/slides/slide13.xml><?xml version="1.0" encoding="utf-8"?>
 <p:sld xmlns:a="http://schemas.openxmlformats.org/drawingml/2006/main" xmlns:r="http://schemas.openxmlformats.org/officeDocument/2006/relationships" xmlns:p="http://schemas.openxmlformats.org/presentationml/2006/main">
   <p:cSld>
     <p:spTree>
@@ -4366,826 +4794,6 @@
 </p:sld>
 </file>
 
-<file path=ppt/slides/slide12.xml><?xml version="1.0" encoding="utf-8"?>
-<p:sld xmlns:a="http://schemas.openxmlformats.org/drawingml/2006/main" xmlns:r="http://schemas.openxmlformats.org/officeDocument/2006/relationships" xmlns:p="http://schemas.openxmlformats.org/presentationml/2006/main">
-  <p:cSld>
-    <p:spTree>
-      <p:nvGrpSpPr>
-        <p:cNvPr id="1" name=""/>
-        <p:cNvGrpSpPr/>
-        <p:nvPr/>
-      </p:nvGrpSpPr>
-      <p:grpSpPr>
-        <a:xfrm>
-          <a:off x="0" y="0"/>
-          <a:ext cx="0" cy="0"/>
-          <a:chOff x="0" y="0"/>
-          <a:chExt cx="0" cy="0"/>
-        </a:xfrm>
-      </p:grpSpPr>
-      <p:sp>
-        <p:nvSpPr>
-          <p:cNvPr id="2" name="Title 1">
-            <a:extLst>
-              <a:ext uri="{FF2B5EF4-FFF2-40B4-BE49-F238E27FC236}">
-                <a16:creationId xmlns:a16="http://schemas.microsoft.com/office/drawing/2014/main" id="{3FC0A6EC-04AA-5B45-94C0-FF1C4EFEF1BA}"/>
-              </a:ext>
-            </a:extLst>
-          </p:cNvPr>
-          <p:cNvSpPr>
-            <a:spLocks noGrp="1"/>
-          </p:cNvSpPr>
-          <p:nvPr>
-            <p:ph type="title"/>
-          </p:nvPr>
-        </p:nvSpPr>
-        <p:spPr/>
-        <p:txBody>
-          <a:bodyPr/>
-          <a:lstStyle/>
-          <a:p>
-            <a:r>
-              <a:rPr lang="en-US" dirty="0"/>
-              <a:t>Publish to GitHub</a:t>
-            </a:r>
-          </a:p>
-        </p:txBody>
-      </p:sp>
-      <p:sp>
-        <p:nvSpPr>
-          <p:cNvPr id="3" name="Content Placeholder 2">
-            <a:extLst>
-              <a:ext uri="{FF2B5EF4-FFF2-40B4-BE49-F238E27FC236}">
-                <a16:creationId xmlns:a16="http://schemas.microsoft.com/office/drawing/2014/main" id="{82EC5F2A-B8D5-F442-A36B-5E8FE02E22DB}"/>
-              </a:ext>
-            </a:extLst>
-          </p:cNvPr>
-          <p:cNvSpPr>
-            <a:spLocks noGrp="1"/>
-          </p:cNvSpPr>
-          <p:nvPr>
-            <p:ph idx="1"/>
-          </p:nvPr>
-        </p:nvSpPr>
-        <p:spPr/>
-        <p:txBody>
-          <a:bodyPr>
-            <a:normAutofit/>
-          </a:bodyPr>
-          <a:lstStyle/>
-          <a:p>
-            <a:endParaRPr lang="en-US" dirty="0"/>
-          </a:p>
-          <a:p>
-            <a:endParaRPr lang="en-US" dirty="0"/>
-          </a:p>
-          <a:p>
-            <a:endParaRPr lang="en-US" dirty="0"/>
-          </a:p>
-        </p:txBody>
-      </p:sp>
-      <p:pic>
-        <p:nvPicPr>
-          <p:cNvPr id="10" name="Picture 9">
-            <a:extLst>
-              <a:ext uri="{FF2B5EF4-FFF2-40B4-BE49-F238E27FC236}">
-                <a16:creationId xmlns:a16="http://schemas.microsoft.com/office/drawing/2014/main" id="{2526DF84-016D-3B45-B0E7-20D3B9A54B50}"/>
-              </a:ext>
-            </a:extLst>
-          </p:cNvPr>
-          <p:cNvPicPr>
-            <a:picLocks noChangeAspect="1"/>
-          </p:cNvPicPr>
-          <p:nvPr/>
-        </p:nvPicPr>
-        <p:blipFill>
-          <a:blip r:embed="rId2"/>
-          <a:stretch>
-            <a:fillRect/>
-          </a:stretch>
-        </p:blipFill>
-        <p:spPr>
-          <a:xfrm>
-            <a:off x="25400" y="1466825"/>
-            <a:ext cx="12141200" cy="596900"/>
-          </a:xfrm>
-          <a:prstGeom prst="rect">
-            <a:avLst/>
-          </a:prstGeom>
-        </p:spPr>
-      </p:pic>
-      <p:pic>
-        <p:nvPicPr>
-          <p:cNvPr id="12" name="Picture 11">
-            <a:extLst>
-              <a:ext uri="{FF2B5EF4-FFF2-40B4-BE49-F238E27FC236}">
-                <a16:creationId xmlns:a16="http://schemas.microsoft.com/office/drawing/2014/main" id="{52B2D2FA-B067-2D47-A459-392B5156A2DA}"/>
-              </a:ext>
-            </a:extLst>
-          </p:cNvPr>
-          <p:cNvPicPr>
-            <a:picLocks noChangeAspect="1"/>
-          </p:cNvPicPr>
-          <p:nvPr/>
-        </p:nvPicPr>
-        <p:blipFill>
-          <a:blip r:embed="rId3"/>
-          <a:stretch>
-            <a:fillRect/>
-          </a:stretch>
-        </p:blipFill>
-        <p:spPr>
-          <a:xfrm>
-            <a:off x="4169960" y="2309644"/>
-            <a:ext cx="4744177" cy="3978301"/>
-          </a:xfrm>
-          <a:prstGeom prst="rect">
-            <a:avLst/>
-          </a:prstGeom>
-        </p:spPr>
-      </p:pic>
-      <p:sp>
-        <p:nvSpPr>
-          <p:cNvPr id="13" name="Down Arrow 12">
-            <a:extLst>
-              <a:ext uri="{FF2B5EF4-FFF2-40B4-BE49-F238E27FC236}">
-                <a16:creationId xmlns:a16="http://schemas.microsoft.com/office/drawing/2014/main" id="{74D43097-4E43-CE49-8262-843BEF0CF549}"/>
-              </a:ext>
-            </a:extLst>
-          </p:cNvPr>
-          <p:cNvSpPr/>
-          <p:nvPr/>
-        </p:nvSpPr>
-        <p:spPr>
-          <a:xfrm>
-            <a:off x="10677103" y="427243"/>
-            <a:ext cx="289931" cy="992459"/>
-          </a:xfrm>
-          <a:prstGeom prst="downArrow">
-            <a:avLst/>
-          </a:prstGeom>
-          <a:solidFill>
-            <a:srgbClr val="C00000"/>
-          </a:solidFill>
-          <a:ln>
-            <a:solidFill>
-              <a:srgbClr val="C00000"/>
-            </a:solidFill>
-          </a:ln>
-        </p:spPr>
-        <p:style>
-          <a:lnRef idx="2">
-            <a:schemeClr val="accent1">
-              <a:shade val="50000"/>
-            </a:schemeClr>
-          </a:lnRef>
-          <a:fillRef idx="1">
-            <a:schemeClr val="accent1"/>
-          </a:fillRef>
-          <a:effectRef idx="0">
-            <a:schemeClr val="accent1"/>
-          </a:effectRef>
-          <a:fontRef idx="minor">
-            <a:schemeClr val="lt1"/>
-          </a:fontRef>
-        </p:style>
-        <p:txBody>
-          <a:bodyPr rtlCol="0" anchor="ctr"/>
-          <a:lstStyle/>
-          <a:p>
-            <a:pPr algn="ctr"/>
-            <a:endParaRPr lang="en-US"/>
-          </a:p>
-        </p:txBody>
-      </p:sp>
-      <p:sp>
-        <p:nvSpPr>
-          <p:cNvPr id="14" name="Down Arrow 13">
-            <a:extLst>
-              <a:ext uri="{FF2B5EF4-FFF2-40B4-BE49-F238E27FC236}">
-                <a16:creationId xmlns:a16="http://schemas.microsoft.com/office/drawing/2014/main" id="{1CC567AC-4472-3A45-887E-16137660C95A}"/>
-              </a:ext>
-            </a:extLst>
-          </p:cNvPr>
-          <p:cNvSpPr/>
-          <p:nvPr/>
-        </p:nvSpPr>
-        <p:spPr>
-          <a:xfrm rot="16200000" flipH="1">
-            <a:off x="3528765" y="4159114"/>
-            <a:ext cx="289931" cy="992459"/>
-          </a:xfrm>
-          <a:prstGeom prst="downArrow">
-            <a:avLst/>
-          </a:prstGeom>
-          <a:solidFill>
-            <a:srgbClr val="C00000"/>
-          </a:solidFill>
-          <a:ln>
-            <a:solidFill>
-              <a:srgbClr val="C00000"/>
-            </a:solidFill>
-          </a:ln>
-        </p:spPr>
-        <p:style>
-          <a:lnRef idx="2">
-            <a:schemeClr val="accent1">
-              <a:shade val="50000"/>
-            </a:schemeClr>
-          </a:lnRef>
-          <a:fillRef idx="1">
-            <a:schemeClr val="accent1"/>
-          </a:fillRef>
-          <a:effectRef idx="0">
-            <a:schemeClr val="accent1"/>
-          </a:effectRef>
-          <a:fontRef idx="minor">
-            <a:schemeClr val="lt1"/>
-          </a:fontRef>
-        </p:style>
-        <p:txBody>
-          <a:bodyPr rtlCol="0" anchor="ctr"/>
-          <a:lstStyle/>
-          <a:p>
-            <a:pPr algn="ctr"/>
-            <a:endParaRPr lang="en-US"/>
-          </a:p>
-        </p:txBody>
-      </p:sp>
-      <p:sp>
-        <p:nvSpPr>
-          <p:cNvPr id="15" name="TextBox 14">
-            <a:extLst>
-              <a:ext uri="{FF2B5EF4-FFF2-40B4-BE49-F238E27FC236}">
-                <a16:creationId xmlns:a16="http://schemas.microsoft.com/office/drawing/2014/main" id="{CC5027FC-EE9B-B549-9226-8CB1E183A407}"/>
-              </a:ext>
-            </a:extLst>
-          </p:cNvPr>
-          <p:cNvSpPr txBox="1"/>
-          <p:nvPr/>
-        </p:nvSpPr>
-        <p:spPr>
-          <a:xfrm>
-            <a:off x="25400" y="4332177"/>
-            <a:ext cx="3052337" cy="646331"/>
-          </a:xfrm>
-          <a:prstGeom prst="rect">
-            <a:avLst/>
-          </a:prstGeom>
-          <a:noFill/>
-        </p:spPr>
-        <p:txBody>
-          <a:bodyPr wrap="square" rtlCol="0">
-            <a:spAutoFit/>
-          </a:bodyPr>
-          <a:lstStyle/>
-          <a:p>
-            <a:pPr algn="r"/>
-            <a:r>
-              <a:rPr lang="en-US" dirty="0"/>
-              <a:t>Public vs private. Not all accounts have this option</a:t>
-            </a:r>
-          </a:p>
-        </p:txBody>
-      </p:sp>
-      <p:sp>
-        <p:nvSpPr>
-          <p:cNvPr id="18" name="Down Arrow 17">
-            <a:extLst>
-              <a:ext uri="{FF2B5EF4-FFF2-40B4-BE49-F238E27FC236}">
-                <a16:creationId xmlns:a16="http://schemas.microsoft.com/office/drawing/2014/main" id="{2C9F58BB-4F0C-6F4D-988C-57903124D6D9}"/>
-              </a:ext>
-            </a:extLst>
-          </p:cNvPr>
-          <p:cNvSpPr/>
-          <p:nvPr/>
-        </p:nvSpPr>
-        <p:spPr>
-          <a:xfrm rot="16200000" flipH="1">
-            <a:off x="3528765" y="4793983"/>
-            <a:ext cx="289931" cy="992459"/>
-          </a:xfrm>
-          <a:prstGeom prst="downArrow">
-            <a:avLst/>
-          </a:prstGeom>
-          <a:solidFill>
-            <a:srgbClr val="C00000"/>
-          </a:solidFill>
-          <a:ln>
-            <a:solidFill>
-              <a:srgbClr val="C00000"/>
-            </a:solidFill>
-          </a:ln>
-        </p:spPr>
-        <p:style>
-          <a:lnRef idx="2">
-            <a:schemeClr val="accent1">
-              <a:shade val="50000"/>
-            </a:schemeClr>
-          </a:lnRef>
-          <a:fillRef idx="1">
-            <a:schemeClr val="accent1"/>
-          </a:fillRef>
-          <a:effectRef idx="0">
-            <a:schemeClr val="accent1"/>
-          </a:effectRef>
-          <a:fontRef idx="minor">
-            <a:schemeClr val="lt1"/>
-          </a:fontRef>
-        </p:style>
-        <p:txBody>
-          <a:bodyPr rtlCol="0" anchor="ctr"/>
-          <a:lstStyle/>
-          <a:p>
-            <a:pPr algn="ctr"/>
-            <a:endParaRPr lang="en-US"/>
-          </a:p>
-        </p:txBody>
-      </p:sp>
-      <p:sp>
-        <p:nvSpPr>
-          <p:cNvPr id="19" name="TextBox 18">
-            <a:extLst>
-              <a:ext uri="{FF2B5EF4-FFF2-40B4-BE49-F238E27FC236}">
-                <a16:creationId xmlns:a16="http://schemas.microsoft.com/office/drawing/2014/main" id="{0875F452-FE08-514A-8806-9DDB8628318A}"/>
-              </a:ext>
-            </a:extLst>
-          </p:cNvPr>
-          <p:cNvSpPr txBox="1"/>
-          <p:nvPr/>
-        </p:nvSpPr>
-        <p:spPr>
-          <a:xfrm>
-            <a:off x="25400" y="5005875"/>
-            <a:ext cx="3052337" cy="646331"/>
-          </a:xfrm>
-          <a:prstGeom prst="rect">
-            <a:avLst/>
-          </a:prstGeom>
-          <a:noFill/>
-        </p:spPr>
-        <p:txBody>
-          <a:bodyPr wrap="square" rtlCol="0">
-            <a:spAutoFit/>
-          </a:bodyPr>
-          <a:lstStyle/>
-          <a:p>
-            <a:pPr algn="r"/>
-            <a:r>
-              <a:rPr lang="en-US" dirty="0"/>
-              <a:t>If you’re part of an organization</a:t>
-            </a:r>
-          </a:p>
-        </p:txBody>
-      </p:sp>
-    </p:spTree>
-    <p:extLst>
-      <p:ext uri="{BB962C8B-B14F-4D97-AF65-F5344CB8AC3E}">
-        <p14:creationId xmlns:p14="http://schemas.microsoft.com/office/powerpoint/2010/main" val="503829201"/>
-      </p:ext>
-    </p:extLst>
-  </p:cSld>
-  <p:clrMapOvr>
-    <a:masterClrMapping/>
-  </p:clrMapOvr>
-</p:sld>
-</file>
-
-<file path=ppt/slides/slide13.xml><?xml version="1.0" encoding="utf-8"?>
-<p:sld xmlns:a="http://schemas.openxmlformats.org/drawingml/2006/main" xmlns:r="http://schemas.openxmlformats.org/officeDocument/2006/relationships" xmlns:p="http://schemas.openxmlformats.org/presentationml/2006/main">
-  <p:cSld>
-    <p:spTree>
-      <p:nvGrpSpPr>
-        <p:cNvPr id="1" name=""/>
-        <p:cNvGrpSpPr/>
-        <p:nvPr/>
-      </p:nvGrpSpPr>
-      <p:grpSpPr>
-        <a:xfrm>
-          <a:off x="0" y="0"/>
-          <a:ext cx="0" cy="0"/>
-          <a:chOff x="0" y="0"/>
-          <a:chExt cx="0" cy="0"/>
-        </a:xfrm>
-      </p:grpSpPr>
-      <p:sp>
-        <p:nvSpPr>
-          <p:cNvPr id="2" name="Title 1">
-            <a:extLst>
-              <a:ext uri="{FF2B5EF4-FFF2-40B4-BE49-F238E27FC236}">
-                <a16:creationId xmlns:a16="http://schemas.microsoft.com/office/drawing/2014/main" id="{3FC0A6EC-04AA-5B45-94C0-FF1C4EFEF1BA}"/>
-              </a:ext>
-            </a:extLst>
-          </p:cNvPr>
-          <p:cNvSpPr>
-            <a:spLocks noGrp="1"/>
-          </p:cNvSpPr>
-          <p:nvPr>
-            <p:ph type="title"/>
-          </p:nvPr>
-        </p:nvSpPr>
-        <p:spPr/>
-        <p:txBody>
-          <a:bodyPr/>
-          <a:lstStyle/>
-          <a:p>
-            <a:r>
-              <a:rPr lang="en-US" dirty="0"/>
-              <a:t>Working with GitHub</a:t>
-            </a:r>
-          </a:p>
-        </p:txBody>
-      </p:sp>
-      <p:pic>
-        <p:nvPicPr>
-          <p:cNvPr id="6" name="Picture 5">
-            <a:extLst>
-              <a:ext uri="{FF2B5EF4-FFF2-40B4-BE49-F238E27FC236}">
-                <a16:creationId xmlns:a16="http://schemas.microsoft.com/office/drawing/2014/main" id="{DB313856-E03C-7544-AC2B-ECDBAE422271}"/>
-              </a:ext>
-            </a:extLst>
-          </p:cNvPr>
-          <p:cNvPicPr>
-            <a:picLocks noChangeAspect="1"/>
-          </p:cNvPicPr>
-          <p:nvPr/>
-        </p:nvPicPr>
-        <p:blipFill>
-          <a:blip r:embed="rId2"/>
-          <a:stretch>
-            <a:fillRect/>
-          </a:stretch>
-        </p:blipFill>
-        <p:spPr>
-          <a:xfrm>
-            <a:off x="25400" y="2074147"/>
-            <a:ext cx="11455400" cy="609600"/>
-          </a:xfrm>
-          <a:prstGeom prst="rect">
-            <a:avLst/>
-          </a:prstGeom>
-        </p:spPr>
-      </p:pic>
-      <p:pic>
-        <p:nvPicPr>
-          <p:cNvPr id="9" name="Picture 8">
-            <a:extLst>
-              <a:ext uri="{FF2B5EF4-FFF2-40B4-BE49-F238E27FC236}">
-                <a16:creationId xmlns:a16="http://schemas.microsoft.com/office/drawing/2014/main" id="{737C7585-4061-AA4D-BEE5-8BA1FF2D6EF2}"/>
-              </a:ext>
-            </a:extLst>
-          </p:cNvPr>
-          <p:cNvPicPr>
-            <a:picLocks noChangeAspect="1"/>
-          </p:cNvPicPr>
-          <p:nvPr/>
-        </p:nvPicPr>
-        <p:blipFill>
-          <a:blip r:embed="rId3"/>
-          <a:stretch>
-            <a:fillRect/>
-          </a:stretch>
-        </p:blipFill>
-        <p:spPr>
-          <a:xfrm>
-            <a:off x="25400" y="5517487"/>
-            <a:ext cx="12166600" cy="596900"/>
-          </a:xfrm>
-          <a:prstGeom prst="rect">
-            <a:avLst/>
-          </a:prstGeom>
-        </p:spPr>
-      </p:pic>
-      <p:sp>
-        <p:nvSpPr>
-          <p:cNvPr id="12" name="Down Arrow 11">
-            <a:extLst>
-              <a:ext uri="{FF2B5EF4-FFF2-40B4-BE49-F238E27FC236}">
-                <a16:creationId xmlns:a16="http://schemas.microsoft.com/office/drawing/2014/main" id="{55DECEDF-4112-B247-8FE0-FC43B40A08C2}"/>
-              </a:ext>
-            </a:extLst>
-          </p:cNvPr>
-          <p:cNvSpPr/>
-          <p:nvPr/>
-        </p:nvSpPr>
-        <p:spPr>
-          <a:xfrm>
-            <a:off x="9952273" y="3129317"/>
-            <a:ext cx="289931" cy="609600"/>
-          </a:xfrm>
-          <a:prstGeom prst="downArrow">
-            <a:avLst/>
-          </a:prstGeom>
-          <a:solidFill>
-            <a:srgbClr val="C00000"/>
-          </a:solidFill>
-          <a:ln>
-            <a:solidFill>
-              <a:srgbClr val="C00000"/>
-            </a:solidFill>
-          </a:ln>
-        </p:spPr>
-        <p:style>
-          <a:lnRef idx="2">
-            <a:schemeClr val="accent1">
-              <a:shade val="50000"/>
-            </a:schemeClr>
-          </a:lnRef>
-          <a:fillRef idx="1">
-            <a:schemeClr val="accent1"/>
-          </a:fillRef>
-          <a:effectRef idx="0">
-            <a:schemeClr val="accent1"/>
-          </a:effectRef>
-          <a:fontRef idx="minor">
-            <a:schemeClr val="lt1"/>
-          </a:fontRef>
-        </p:style>
-        <p:txBody>
-          <a:bodyPr rtlCol="0" anchor="ctr"/>
-          <a:lstStyle/>
-          <a:p>
-            <a:pPr algn="ctr"/>
-            <a:endParaRPr lang="en-US"/>
-          </a:p>
-        </p:txBody>
-      </p:sp>
-      <p:sp>
-        <p:nvSpPr>
-          <p:cNvPr id="13" name="Down Arrow 12">
-            <a:extLst>
-              <a:ext uri="{FF2B5EF4-FFF2-40B4-BE49-F238E27FC236}">
-                <a16:creationId xmlns:a16="http://schemas.microsoft.com/office/drawing/2014/main" id="{1B5FB6D1-5AC1-0B4A-915F-6A47F533BC09}"/>
-              </a:ext>
-            </a:extLst>
-          </p:cNvPr>
-          <p:cNvSpPr/>
-          <p:nvPr/>
-        </p:nvSpPr>
-        <p:spPr>
-          <a:xfrm>
-            <a:off x="9952272" y="1418870"/>
-            <a:ext cx="289931" cy="627592"/>
-          </a:xfrm>
-          <a:prstGeom prst="downArrow">
-            <a:avLst>
-              <a:gd name="adj1" fmla="val 50000"/>
-              <a:gd name="adj2" fmla="val 50000"/>
-            </a:avLst>
-          </a:prstGeom>
-          <a:solidFill>
-            <a:srgbClr val="C00000"/>
-          </a:solidFill>
-          <a:ln>
-            <a:solidFill>
-              <a:srgbClr val="C00000"/>
-            </a:solidFill>
-          </a:ln>
-        </p:spPr>
-        <p:style>
-          <a:lnRef idx="2">
-            <a:schemeClr val="accent1">
-              <a:shade val="50000"/>
-            </a:schemeClr>
-          </a:lnRef>
-          <a:fillRef idx="1">
-            <a:schemeClr val="accent1"/>
-          </a:fillRef>
-          <a:effectRef idx="0">
-            <a:schemeClr val="accent1"/>
-          </a:effectRef>
-          <a:fontRef idx="minor">
-            <a:schemeClr val="lt1"/>
-          </a:fontRef>
-        </p:style>
-        <p:txBody>
-          <a:bodyPr rtlCol="0" anchor="ctr"/>
-          <a:lstStyle/>
-          <a:p>
-            <a:pPr algn="ctr"/>
-            <a:endParaRPr lang="en-US"/>
-          </a:p>
-        </p:txBody>
-      </p:sp>
-      <p:pic>
-        <p:nvPicPr>
-          <p:cNvPr id="16" name="Picture 15">
-            <a:extLst>
-              <a:ext uri="{FF2B5EF4-FFF2-40B4-BE49-F238E27FC236}">
-                <a16:creationId xmlns:a16="http://schemas.microsoft.com/office/drawing/2014/main" id="{34AD2183-5A45-DD42-BF5F-6A14E07A2CD7}"/>
-              </a:ext>
-            </a:extLst>
-          </p:cNvPr>
-          <p:cNvPicPr>
-            <a:picLocks noChangeAspect="1"/>
-          </p:cNvPicPr>
-          <p:nvPr/>
-        </p:nvPicPr>
-        <p:blipFill>
-          <a:blip r:embed="rId4"/>
-          <a:stretch>
-            <a:fillRect/>
-          </a:stretch>
-        </p:blipFill>
-        <p:spPr>
-          <a:xfrm>
-            <a:off x="0" y="3784594"/>
-            <a:ext cx="12115800" cy="609600"/>
-          </a:xfrm>
-          <a:prstGeom prst="rect">
-            <a:avLst/>
-          </a:prstGeom>
-        </p:spPr>
-      </p:pic>
-      <p:sp>
-        <p:nvSpPr>
-          <p:cNvPr id="17" name="TextBox 16">
-            <a:extLst>
-              <a:ext uri="{FF2B5EF4-FFF2-40B4-BE49-F238E27FC236}">
-                <a16:creationId xmlns:a16="http://schemas.microsoft.com/office/drawing/2014/main" id="{19E7BD0B-71D2-AD41-902D-A20FE316BD5C}"/>
-              </a:ext>
-            </a:extLst>
-          </p:cNvPr>
-          <p:cNvSpPr txBox="1"/>
-          <p:nvPr/>
-        </p:nvSpPr>
-        <p:spPr>
-          <a:xfrm>
-            <a:off x="6322741" y="3022582"/>
-            <a:ext cx="3629531" cy="646331"/>
-          </a:xfrm>
-          <a:prstGeom prst="rect">
-            <a:avLst/>
-          </a:prstGeom>
-          <a:noFill/>
-        </p:spPr>
-        <p:txBody>
-          <a:bodyPr wrap="square" rtlCol="0">
-            <a:spAutoFit/>
-          </a:bodyPr>
-          <a:lstStyle/>
-          <a:p>
-            <a:pPr algn="r"/>
-            <a:r>
-              <a:rPr lang="en-US" dirty="0"/>
-              <a:t>Local copy does not match GitHub.</a:t>
-            </a:r>
-          </a:p>
-          <a:p>
-            <a:pPr algn="r"/>
-            <a:r>
-              <a:rPr lang="en-US" dirty="0"/>
-              <a:t>Click to update GitHub</a:t>
-            </a:r>
-          </a:p>
-        </p:txBody>
-      </p:sp>
-      <p:sp>
-        <p:nvSpPr>
-          <p:cNvPr id="18" name="TextBox 17">
-            <a:extLst>
-              <a:ext uri="{FF2B5EF4-FFF2-40B4-BE49-F238E27FC236}">
-                <a16:creationId xmlns:a16="http://schemas.microsoft.com/office/drawing/2014/main" id="{44F6B97C-0A35-8E4D-948F-7784C3C874BB}"/>
-              </a:ext>
-            </a:extLst>
-          </p:cNvPr>
-          <p:cNvSpPr txBox="1"/>
-          <p:nvPr/>
-        </p:nvSpPr>
-        <p:spPr>
-          <a:xfrm>
-            <a:off x="6322741" y="1365566"/>
-            <a:ext cx="3629531" cy="369332"/>
-          </a:xfrm>
-          <a:prstGeom prst="rect">
-            <a:avLst/>
-          </a:prstGeom>
-          <a:noFill/>
-        </p:spPr>
-        <p:txBody>
-          <a:bodyPr wrap="square" rtlCol="0">
-            <a:spAutoFit/>
-          </a:bodyPr>
-          <a:lstStyle/>
-          <a:p>
-            <a:pPr algn="r"/>
-            <a:r>
-              <a:rPr lang="en-US" dirty="0"/>
-              <a:t>Check if local and GitHub match</a:t>
-            </a:r>
-          </a:p>
-        </p:txBody>
-      </p:sp>
-      <p:sp>
-        <p:nvSpPr>
-          <p:cNvPr id="19" name="Down Arrow 18">
-            <a:extLst>
-              <a:ext uri="{FF2B5EF4-FFF2-40B4-BE49-F238E27FC236}">
-                <a16:creationId xmlns:a16="http://schemas.microsoft.com/office/drawing/2014/main" id="{99BF6709-EAF3-B241-885E-D09C07494C7A}"/>
-              </a:ext>
-            </a:extLst>
-          </p:cNvPr>
-          <p:cNvSpPr/>
-          <p:nvPr/>
-        </p:nvSpPr>
-        <p:spPr>
-          <a:xfrm>
-            <a:off x="9952272" y="4861906"/>
-            <a:ext cx="289931" cy="569178"/>
-          </a:xfrm>
-          <a:prstGeom prst="downArrow">
-            <a:avLst/>
-          </a:prstGeom>
-          <a:solidFill>
-            <a:srgbClr val="C00000"/>
-          </a:solidFill>
-          <a:ln>
-            <a:solidFill>
-              <a:srgbClr val="C00000"/>
-            </a:solidFill>
-          </a:ln>
-        </p:spPr>
-        <p:style>
-          <a:lnRef idx="2">
-            <a:schemeClr val="accent1">
-              <a:shade val="50000"/>
-            </a:schemeClr>
-          </a:lnRef>
-          <a:fillRef idx="1">
-            <a:schemeClr val="accent1"/>
-          </a:fillRef>
-          <a:effectRef idx="0">
-            <a:schemeClr val="accent1"/>
-          </a:effectRef>
-          <a:fontRef idx="minor">
-            <a:schemeClr val="lt1"/>
-          </a:fontRef>
-        </p:style>
-        <p:txBody>
-          <a:bodyPr rtlCol="0" anchor="ctr"/>
-          <a:lstStyle/>
-          <a:p>
-            <a:pPr algn="ctr"/>
-            <a:endParaRPr lang="en-US"/>
-          </a:p>
-        </p:txBody>
-      </p:sp>
-      <p:sp>
-        <p:nvSpPr>
-          <p:cNvPr id="20" name="TextBox 19">
-            <a:extLst>
-              <a:ext uri="{FF2B5EF4-FFF2-40B4-BE49-F238E27FC236}">
-                <a16:creationId xmlns:a16="http://schemas.microsoft.com/office/drawing/2014/main" id="{0028DD9F-D597-AA4F-8F5F-A9A43ADA01C0}"/>
-              </a:ext>
-            </a:extLst>
-          </p:cNvPr>
-          <p:cNvSpPr txBox="1"/>
-          <p:nvPr/>
-        </p:nvSpPr>
-        <p:spPr>
-          <a:xfrm>
-            <a:off x="6322741" y="4750188"/>
-            <a:ext cx="3629531" cy="646331"/>
-          </a:xfrm>
-          <a:prstGeom prst="rect">
-            <a:avLst/>
-          </a:prstGeom>
-          <a:noFill/>
-        </p:spPr>
-        <p:txBody>
-          <a:bodyPr wrap="square" rtlCol="0">
-            <a:spAutoFit/>
-          </a:bodyPr>
-          <a:lstStyle/>
-          <a:p>
-            <a:pPr algn="r"/>
-            <a:r>
-              <a:rPr lang="en-US" dirty="0"/>
-              <a:t>Local copy does not match GitHub.</a:t>
-            </a:r>
-          </a:p>
-          <a:p>
-            <a:pPr algn="r"/>
-            <a:r>
-              <a:rPr lang="en-US" dirty="0"/>
-              <a:t>Click to update local</a:t>
-            </a:r>
-          </a:p>
-        </p:txBody>
-      </p:sp>
-    </p:spTree>
-    <p:extLst>
-      <p:ext uri="{BB962C8B-B14F-4D97-AF65-F5344CB8AC3E}">
-        <p14:creationId xmlns:p14="http://schemas.microsoft.com/office/powerpoint/2010/main" val="2094645739"/>
-      </p:ext>
-    </p:extLst>
-  </p:cSld>
-  <p:clrMapOvr>
-    <a:masterClrMapping/>
-  </p:clrMapOvr>
-</p:sld>
-</file>
-
 <file path=ppt/slides/slide14.xml><?xml version="1.0" encoding="utf-8"?>
 <p:sld xmlns:a="http://schemas.openxmlformats.org/drawingml/2006/main" xmlns:r="http://schemas.openxmlformats.org/officeDocument/2006/relationships" xmlns:p="http://schemas.openxmlformats.org/presentationml/2006/main">
   <p:cSld>
@@ -5226,26 +4834,57 @@
           <a:p>
             <a:r>
               <a:rPr lang="en-US" dirty="0"/>
-              <a:t>GitHub repos</a:t>
-            </a:r>
+              <a:t>Publish to GitHub</a:t>
+            </a:r>
+          </a:p>
+        </p:txBody>
+      </p:sp>
+      <p:sp>
+        <p:nvSpPr>
+          <p:cNvPr id="3" name="Content Placeholder 2">
+            <a:extLst>
+              <a:ext uri="{FF2B5EF4-FFF2-40B4-BE49-F238E27FC236}">
+                <a16:creationId xmlns:a16="http://schemas.microsoft.com/office/drawing/2014/main" id="{82EC5F2A-B8D5-F442-A36B-5E8FE02E22DB}"/>
+              </a:ext>
+            </a:extLst>
+          </p:cNvPr>
+          <p:cNvSpPr>
+            <a:spLocks noGrp="1"/>
+          </p:cNvSpPr>
+          <p:nvPr>
+            <p:ph idx="1"/>
+          </p:nvPr>
+        </p:nvSpPr>
+        <p:spPr/>
+        <p:txBody>
+          <a:bodyPr>
+            <a:normAutofit/>
+          </a:bodyPr>
+          <a:lstStyle/>
+          <a:p>
+            <a:endParaRPr lang="en-US" dirty="0"/>
+          </a:p>
+          <a:p>
+            <a:endParaRPr lang="en-US" dirty="0"/>
+          </a:p>
+          <a:p>
+            <a:endParaRPr lang="en-US" dirty="0"/>
           </a:p>
         </p:txBody>
       </p:sp>
       <p:pic>
         <p:nvPicPr>
-          <p:cNvPr id="7" name="Content Placeholder 6">
-            <a:extLst>
-              <a:ext uri="{FF2B5EF4-FFF2-40B4-BE49-F238E27FC236}">
-                <a16:creationId xmlns:a16="http://schemas.microsoft.com/office/drawing/2014/main" id="{5061130F-26F9-4C40-9EE4-E5228A3A8660}"/>
+          <p:cNvPr id="10" name="Picture 9">
+            <a:extLst>
+              <a:ext uri="{FF2B5EF4-FFF2-40B4-BE49-F238E27FC236}">
+                <a16:creationId xmlns:a16="http://schemas.microsoft.com/office/drawing/2014/main" id="{2526DF84-016D-3B45-B0E7-20D3B9A54B50}"/>
               </a:ext>
             </a:extLst>
           </p:cNvPr>
           <p:cNvPicPr>
-            <a:picLocks noGrp="1" noChangeAspect="1"/>
+            <a:picLocks noChangeAspect="1"/>
           </p:cNvPicPr>
-          <p:nvPr>
-            <p:ph idx="1"/>
-          </p:nvPr>
+          <p:nvPr/>
         </p:nvPicPr>
         <p:blipFill>
           <a:blip r:embed="rId2"/>
@@ -5255,17 +4894,50 @@
         </p:blipFill>
         <p:spPr>
           <a:xfrm>
-            <a:off x="838200" y="2499143"/>
-            <a:ext cx="10515600" cy="3989525"/>
-          </a:xfrm>
+            <a:off x="25400" y="1466825"/>
+            <a:ext cx="12141200" cy="596900"/>
+          </a:xfrm>
+          <a:prstGeom prst="rect">
+            <a:avLst/>
+          </a:prstGeom>
         </p:spPr>
       </p:pic>
-      <p:sp>
-        <p:nvSpPr>
-          <p:cNvPr id="10" name="Down Arrow 9">
-            <a:extLst>
-              <a:ext uri="{FF2B5EF4-FFF2-40B4-BE49-F238E27FC236}">
-                <a16:creationId xmlns:a16="http://schemas.microsoft.com/office/drawing/2014/main" id="{D25902B8-C2BF-E949-9870-4E6FF4D43999}"/>
+      <p:pic>
+        <p:nvPicPr>
+          <p:cNvPr id="12" name="Picture 11">
+            <a:extLst>
+              <a:ext uri="{FF2B5EF4-FFF2-40B4-BE49-F238E27FC236}">
+                <a16:creationId xmlns:a16="http://schemas.microsoft.com/office/drawing/2014/main" id="{52B2D2FA-B067-2D47-A459-392B5156A2DA}"/>
+              </a:ext>
+            </a:extLst>
+          </p:cNvPr>
+          <p:cNvPicPr>
+            <a:picLocks noChangeAspect="1"/>
+          </p:cNvPicPr>
+          <p:nvPr/>
+        </p:nvPicPr>
+        <p:blipFill>
+          <a:blip r:embed="rId3"/>
+          <a:stretch>
+            <a:fillRect/>
+          </a:stretch>
+        </p:blipFill>
+        <p:spPr>
+          <a:xfrm>
+            <a:off x="4169960" y="2309644"/>
+            <a:ext cx="4744177" cy="3978301"/>
+          </a:xfrm>
+          <a:prstGeom prst="rect">
+            <a:avLst/>
+          </a:prstGeom>
+        </p:spPr>
+      </p:pic>
+      <p:sp>
+        <p:nvSpPr>
+          <p:cNvPr id="13" name="Down Arrow 12">
+            <a:extLst>
+              <a:ext uri="{FF2B5EF4-FFF2-40B4-BE49-F238E27FC236}">
+                <a16:creationId xmlns:a16="http://schemas.microsoft.com/office/drawing/2014/main" id="{74D43097-4E43-CE49-8262-843BEF0CF549}"/>
               </a:ext>
             </a:extLst>
           </p:cNvPr>
@@ -5274,14 +4946,11 @@
         </p:nvSpPr>
         <p:spPr>
           <a:xfrm>
-            <a:off x="3129659" y="2393688"/>
-            <a:ext cx="289931" cy="627592"/>
+            <a:off x="10677103" y="427243"/>
+            <a:ext cx="289931" cy="992459"/>
           </a:xfrm>
           <a:prstGeom prst="downArrow">
-            <a:avLst>
-              <a:gd name="adj1" fmla="val 50000"/>
-              <a:gd name="adj2" fmla="val 50000"/>
-            </a:avLst>
+            <a:avLst/>
           </a:prstGeom>
           <a:solidFill>
             <a:srgbClr val="C00000"/>
@@ -5319,45 +4988,10 @@
       </p:sp>
       <p:sp>
         <p:nvSpPr>
-          <p:cNvPr id="11" name="TextBox 10">
-            <a:extLst>
-              <a:ext uri="{FF2B5EF4-FFF2-40B4-BE49-F238E27FC236}">
-                <a16:creationId xmlns:a16="http://schemas.microsoft.com/office/drawing/2014/main" id="{BDFC1D0A-A3DC-0847-A131-0A4046146304}"/>
-              </a:ext>
-            </a:extLst>
-          </p:cNvPr>
-          <p:cNvSpPr txBox="1"/>
-          <p:nvPr/>
-        </p:nvSpPr>
-        <p:spPr>
-          <a:xfrm>
-            <a:off x="3129659" y="1617566"/>
-            <a:ext cx="2966341" cy="646331"/>
-          </a:xfrm>
-          <a:prstGeom prst="rect">
-            <a:avLst/>
-          </a:prstGeom>
-          <a:noFill/>
-        </p:spPr>
-        <p:txBody>
-          <a:bodyPr wrap="square" rtlCol="0">
-            <a:spAutoFit/>
-          </a:bodyPr>
-          <a:lstStyle/>
-          <a:p>
-            <a:r>
-              <a:rPr lang="en-US" dirty="0"/>
-              <a:t>Requests to merge in someone else’s code</a:t>
-            </a:r>
-          </a:p>
-        </p:txBody>
-      </p:sp>
-      <p:sp>
-        <p:nvSpPr>
-          <p:cNvPr id="12" name="Down Arrow 11">
-            <a:extLst>
-              <a:ext uri="{FF2B5EF4-FFF2-40B4-BE49-F238E27FC236}">
-                <a16:creationId xmlns:a16="http://schemas.microsoft.com/office/drawing/2014/main" id="{F6655E4A-7E91-0946-B95C-DFF6D23A23EA}"/>
+          <p:cNvPr id="14" name="Down Arrow 13">
+            <a:extLst>
+              <a:ext uri="{FF2B5EF4-FFF2-40B4-BE49-F238E27FC236}">
+                <a16:creationId xmlns:a16="http://schemas.microsoft.com/office/drawing/2014/main" id="{1CC567AC-4472-3A45-887E-16137660C95A}"/>
               </a:ext>
             </a:extLst>
           </p:cNvPr>
@@ -5365,15 +4999,12 @@
           <p:nvPr/>
         </p:nvSpPr>
         <p:spPr>
-          <a:xfrm>
-            <a:off x="2071015" y="2393688"/>
-            <a:ext cx="289931" cy="627592"/>
+          <a:xfrm rot="16200000" flipH="1">
+            <a:off x="3528765" y="4159114"/>
+            <a:ext cx="289931" cy="992459"/>
           </a:xfrm>
           <a:prstGeom prst="downArrow">
-            <a:avLst>
-              <a:gd name="adj1" fmla="val 50000"/>
-              <a:gd name="adj2" fmla="val 50000"/>
-            </a:avLst>
+            <a:avLst/>
           </a:prstGeom>
           <a:solidFill>
             <a:srgbClr val="C00000"/>
@@ -5411,10 +5042,10 @@
       </p:sp>
       <p:sp>
         <p:nvSpPr>
-          <p:cNvPr id="13" name="TextBox 12">
-            <a:extLst>
-              <a:ext uri="{FF2B5EF4-FFF2-40B4-BE49-F238E27FC236}">
-                <a16:creationId xmlns:a16="http://schemas.microsoft.com/office/drawing/2014/main" id="{E4E438D5-E79D-BD40-AD51-72B2138B51B2}"/>
+          <p:cNvPr id="15" name="TextBox 14">
+            <a:extLst>
+              <a:ext uri="{FF2B5EF4-FFF2-40B4-BE49-F238E27FC236}">
+                <a16:creationId xmlns:a16="http://schemas.microsoft.com/office/drawing/2014/main" id="{CC5027FC-EE9B-B549-9226-8CB1E183A407}"/>
               </a:ext>
             </a:extLst>
           </p:cNvPr>
@@ -5423,8 +5054,8 @@
         </p:nvSpPr>
         <p:spPr>
           <a:xfrm>
-            <a:off x="-53374" y="1479067"/>
-            <a:ext cx="2741018" cy="923330"/>
+            <a:off x="25400" y="4332177"/>
+            <a:ext cx="3052337" cy="646331"/>
           </a:xfrm>
           <a:prstGeom prst="rect">
             <a:avLst/>
@@ -5440,25 +5071,17 @@
             <a:pPr algn="r"/>
             <a:r>
               <a:rPr lang="en-US" dirty="0"/>
-              <a:t>Let others know about errors, requested features, </a:t>
-            </a:r>
-            <a:r>
-              <a:rPr lang="en-US" dirty="0" err="1"/>
-              <a:t>etc</a:t>
-            </a:r>
-            <a:r>
-              <a:rPr lang="en-US" dirty="0"/>
-              <a:t> in their repo</a:t>
-            </a:r>
-          </a:p>
-        </p:txBody>
-      </p:sp>
-      <p:sp>
-        <p:nvSpPr>
-          <p:cNvPr id="14" name="Down Arrow 13">
-            <a:extLst>
-              <a:ext uri="{FF2B5EF4-FFF2-40B4-BE49-F238E27FC236}">
-                <a16:creationId xmlns:a16="http://schemas.microsoft.com/office/drawing/2014/main" id="{EBA3E145-CB77-E447-8D59-124E93C823B6}"/>
+              <a:t>Public vs private. Not all accounts have this option</a:t>
+            </a:r>
+          </a:p>
+        </p:txBody>
+      </p:sp>
+      <p:sp>
+        <p:nvSpPr>
+          <p:cNvPr id="18" name="Down Arrow 17">
+            <a:extLst>
+              <a:ext uri="{FF2B5EF4-FFF2-40B4-BE49-F238E27FC236}">
+                <a16:creationId xmlns:a16="http://schemas.microsoft.com/office/drawing/2014/main" id="{2C9F58BB-4F0C-6F4D-988C-57903124D6D9}"/>
               </a:ext>
             </a:extLst>
           </p:cNvPr>
@@ -5467,7 +5090,7 @@
         </p:nvSpPr>
         <p:spPr>
           <a:xfrm rot="16200000" flipH="1">
-            <a:off x="3038908" y="5039018"/>
+            <a:off x="3528765" y="4793983"/>
             <a:ext cx="289931" cy="992459"/>
           </a:xfrm>
           <a:prstGeom prst="downArrow">
@@ -5509,10 +5132,10 @@
       </p:sp>
       <p:sp>
         <p:nvSpPr>
-          <p:cNvPr id="15" name="TextBox 14">
-            <a:extLst>
-              <a:ext uri="{FF2B5EF4-FFF2-40B4-BE49-F238E27FC236}">
-                <a16:creationId xmlns:a16="http://schemas.microsoft.com/office/drawing/2014/main" id="{97B1BE47-D41F-0F42-80E3-ED2E32159856}"/>
+          <p:cNvPr id="19" name="TextBox 18">
+            <a:extLst>
+              <a:ext uri="{FF2B5EF4-FFF2-40B4-BE49-F238E27FC236}">
+                <a16:creationId xmlns:a16="http://schemas.microsoft.com/office/drawing/2014/main" id="{0875F452-FE08-514A-8806-9DDB8628318A}"/>
               </a:ext>
             </a:extLst>
           </p:cNvPr>
@@ -5521,8 +5144,8 @@
         </p:nvSpPr>
         <p:spPr>
           <a:xfrm>
-            <a:off x="304800" y="5212081"/>
-            <a:ext cx="2283080" cy="646331"/>
+            <a:off x="25400" y="5005875"/>
+            <a:ext cx="3052337" cy="646331"/>
           </a:xfrm>
           <a:prstGeom prst="rect">
             <a:avLst/>
@@ -5538,97 +5161,7 @@
             <a:pPr algn="r"/>
             <a:r>
               <a:rPr lang="en-US" dirty="0"/>
-              <a:t>Automatically renders README</a:t>
-            </a:r>
-          </a:p>
-        </p:txBody>
-      </p:sp>
-      <p:sp>
-        <p:nvSpPr>
-          <p:cNvPr id="16" name="Down Arrow 15">
-            <a:extLst>
-              <a:ext uri="{FF2B5EF4-FFF2-40B4-BE49-F238E27FC236}">
-                <a16:creationId xmlns:a16="http://schemas.microsoft.com/office/drawing/2014/main" id="{BAE24606-0A2B-474D-9D47-581C2684B615}"/>
-              </a:ext>
-            </a:extLst>
-          </p:cNvPr>
-          <p:cNvSpPr/>
-          <p:nvPr/>
-        </p:nvSpPr>
-        <p:spPr>
-          <a:xfrm rot="16200000" flipH="1">
-            <a:off x="3038908" y="4104004"/>
-            <a:ext cx="289931" cy="992459"/>
-          </a:xfrm>
-          <a:prstGeom prst="downArrow">
-            <a:avLst/>
-          </a:prstGeom>
-          <a:solidFill>
-            <a:srgbClr val="C00000"/>
-          </a:solidFill>
-          <a:ln>
-            <a:solidFill>
-              <a:srgbClr val="C00000"/>
-            </a:solidFill>
-          </a:ln>
-        </p:spPr>
-        <p:style>
-          <a:lnRef idx="2">
-            <a:schemeClr val="accent1">
-              <a:shade val="50000"/>
-            </a:schemeClr>
-          </a:lnRef>
-          <a:fillRef idx="1">
-            <a:schemeClr val="accent1"/>
-          </a:fillRef>
-          <a:effectRef idx="0">
-            <a:schemeClr val="accent1"/>
-          </a:effectRef>
-          <a:fontRef idx="minor">
-            <a:schemeClr val="lt1"/>
-          </a:fontRef>
-        </p:style>
-        <p:txBody>
-          <a:bodyPr rtlCol="0" anchor="ctr"/>
-          <a:lstStyle/>
-          <a:p>
-            <a:pPr algn="ctr"/>
-            <a:endParaRPr lang="en-US"/>
-          </a:p>
-        </p:txBody>
-      </p:sp>
-      <p:sp>
-        <p:nvSpPr>
-          <p:cNvPr id="17" name="TextBox 16">
-            <a:extLst>
-              <a:ext uri="{FF2B5EF4-FFF2-40B4-BE49-F238E27FC236}">
-                <a16:creationId xmlns:a16="http://schemas.microsoft.com/office/drawing/2014/main" id="{64850C38-135B-F44E-AFB9-E74E5597C00B}"/>
-              </a:ext>
-            </a:extLst>
-          </p:cNvPr>
-          <p:cNvSpPr txBox="1"/>
-          <p:nvPr/>
-        </p:nvSpPr>
-        <p:spPr>
-          <a:xfrm>
-            <a:off x="304800" y="4397159"/>
-            <a:ext cx="2283080" cy="369332"/>
-          </a:xfrm>
-          <a:prstGeom prst="rect">
-            <a:avLst/>
-          </a:prstGeom>
-          <a:noFill/>
-        </p:spPr>
-        <p:txBody>
-          <a:bodyPr wrap="square" rtlCol="0">
-            <a:spAutoFit/>
-          </a:bodyPr>
-          <a:lstStyle/>
-          <a:p>
-            <a:pPr algn="r"/>
-            <a:r>
-              <a:rPr lang="en-US" dirty="0"/>
-              <a:t>Files in repo</a:t>
+              <a:t>If you’re part of an organization</a:t>
             </a:r>
           </a:p>
         </p:txBody>
@@ -5636,7 +5169,7 @@
     </p:spTree>
     <p:extLst>
       <p:ext uri="{BB962C8B-B14F-4D97-AF65-F5344CB8AC3E}">
-        <p14:creationId xmlns:p14="http://schemas.microsoft.com/office/powerpoint/2010/main" val="2789988486"/>
+        <p14:creationId xmlns:p14="http://schemas.microsoft.com/office/powerpoint/2010/main" val="503829201"/>
       </p:ext>
     </p:extLst>
   </p:cSld>
@@ -5665,264 +5198,45 @@
       </p:grpSpPr>
       <p:sp>
         <p:nvSpPr>
-          <p:cNvPr id="10" name="Content Placeholder 2">
-            <a:extLst>
-              <a:ext uri="{FF2B5EF4-FFF2-40B4-BE49-F238E27FC236}">
-                <a16:creationId xmlns:a16="http://schemas.microsoft.com/office/drawing/2014/main" id="{FAEBE401-A433-894F-BC93-CACE870CCE3A}"/>
-              </a:ext>
-            </a:extLst>
-          </p:cNvPr>
-          <p:cNvSpPr txBox="1">
-            <a:spLocks/>
-          </p:cNvSpPr>
-          <p:nvPr/>
-        </p:nvSpPr>
-        <p:spPr>
-          <a:xfrm>
-            <a:off x="838200" y="1524000"/>
-            <a:ext cx="10515600" cy="4626429"/>
-          </a:xfrm>
-          <a:prstGeom prst="rect">
-            <a:avLst/>
-          </a:prstGeom>
-        </p:spPr>
-        <p:txBody>
-          <a:bodyPr vert="horz" lIns="91440" tIns="45720" rIns="91440" bIns="45720" rtlCol="0">
-            <a:normAutofit/>
-          </a:bodyPr>
-          <a:lstStyle>
-            <a:lvl1pPr marL="228600" indent="-228600" algn="l" defTabSz="914400" rtl="0" eaLnBrk="1" latinLnBrk="0" hangingPunct="1">
-              <a:lnSpc>
-                <a:spcPct val="90000"/>
-              </a:lnSpc>
-              <a:spcBef>
-                <a:spcPts val="1000"/>
-              </a:spcBef>
-              <a:buFont typeface="Arial" panose="020B0604020202020204" pitchFamily="34" charset="0"/>
-              <a:buChar char="•"/>
-              <a:defRPr sz="2800" kern="1200">
-                <a:solidFill>
-                  <a:schemeClr val="tx1"/>
-                </a:solidFill>
-                <a:latin typeface="+mn-lt"/>
-                <a:ea typeface="+mn-ea"/>
-                <a:cs typeface="+mn-cs"/>
-              </a:defRPr>
-            </a:lvl1pPr>
-            <a:lvl2pPr marL="685800" indent="-228600" algn="l" defTabSz="914400" rtl="0" eaLnBrk="1" latinLnBrk="0" hangingPunct="1">
-              <a:lnSpc>
-                <a:spcPct val="90000"/>
-              </a:lnSpc>
-              <a:spcBef>
-                <a:spcPts val="500"/>
-              </a:spcBef>
-              <a:buFont typeface="Arial" panose="020B0604020202020204" pitchFamily="34" charset="0"/>
-              <a:buChar char="•"/>
-              <a:defRPr sz="2400" kern="1200">
-                <a:solidFill>
-                  <a:schemeClr val="tx1"/>
-                </a:solidFill>
-                <a:latin typeface="+mn-lt"/>
-                <a:ea typeface="+mn-ea"/>
-                <a:cs typeface="+mn-cs"/>
-              </a:defRPr>
-            </a:lvl2pPr>
-            <a:lvl3pPr marL="1143000" indent="-228600" algn="l" defTabSz="914400" rtl="0" eaLnBrk="1" latinLnBrk="0" hangingPunct="1">
-              <a:lnSpc>
-                <a:spcPct val="90000"/>
-              </a:lnSpc>
-              <a:spcBef>
-                <a:spcPts val="500"/>
-              </a:spcBef>
-              <a:buFont typeface="Arial" panose="020B0604020202020204" pitchFamily="34" charset="0"/>
-              <a:buChar char="•"/>
-              <a:defRPr sz="2000" kern="1200">
-                <a:solidFill>
-                  <a:schemeClr val="tx1"/>
-                </a:solidFill>
-                <a:latin typeface="+mn-lt"/>
-                <a:ea typeface="+mn-ea"/>
-                <a:cs typeface="+mn-cs"/>
-              </a:defRPr>
-            </a:lvl3pPr>
-            <a:lvl4pPr marL="1600200" indent="-228600" algn="l" defTabSz="914400" rtl="0" eaLnBrk="1" latinLnBrk="0" hangingPunct="1">
-              <a:lnSpc>
-                <a:spcPct val="90000"/>
-              </a:lnSpc>
-              <a:spcBef>
-                <a:spcPts val="500"/>
-              </a:spcBef>
-              <a:buFont typeface="Arial" panose="020B0604020202020204" pitchFamily="34" charset="0"/>
-              <a:buChar char="•"/>
-              <a:defRPr sz="1800" kern="1200">
-                <a:solidFill>
-                  <a:schemeClr val="tx1"/>
-                </a:solidFill>
-                <a:latin typeface="+mn-lt"/>
-                <a:ea typeface="+mn-ea"/>
-                <a:cs typeface="+mn-cs"/>
-              </a:defRPr>
-            </a:lvl4pPr>
-            <a:lvl5pPr marL="2057400" indent="-228600" algn="l" defTabSz="914400" rtl="0" eaLnBrk="1" latinLnBrk="0" hangingPunct="1">
-              <a:lnSpc>
-                <a:spcPct val="90000"/>
-              </a:lnSpc>
-              <a:spcBef>
-                <a:spcPts val="500"/>
-              </a:spcBef>
-              <a:buFont typeface="Arial" panose="020B0604020202020204" pitchFamily="34" charset="0"/>
-              <a:buChar char="•"/>
-              <a:defRPr sz="1800" kern="1200">
-                <a:solidFill>
-                  <a:schemeClr val="tx1"/>
-                </a:solidFill>
-                <a:latin typeface="+mn-lt"/>
-                <a:ea typeface="+mn-ea"/>
-                <a:cs typeface="+mn-cs"/>
-              </a:defRPr>
-            </a:lvl5pPr>
-            <a:lvl6pPr marL="2514600" indent="-228600" algn="l" defTabSz="914400" rtl="0" eaLnBrk="1" latinLnBrk="0" hangingPunct="1">
-              <a:lnSpc>
-                <a:spcPct val="90000"/>
-              </a:lnSpc>
-              <a:spcBef>
-                <a:spcPts val="500"/>
-              </a:spcBef>
-              <a:buFont typeface="Arial" panose="020B0604020202020204" pitchFamily="34" charset="0"/>
-              <a:buChar char="•"/>
-              <a:defRPr sz="1800" kern="1200">
-                <a:solidFill>
-                  <a:schemeClr val="tx1"/>
-                </a:solidFill>
-                <a:latin typeface="+mn-lt"/>
-                <a:ea typeface="+mn-ea"/>
-                <a:cs typeface="+mn-cs"/>
-              </a:defRPr>
-            </a:lvl6pPr>
-            <a:lvl7pPr marL="2971800" indent="-228600" algn="l" defTabSz="914400" rtl="0" eaLnBrk="1" latinLnBrk="0" hangingPunct="1">
-              <a:lnSpc>
-                <a:spcPct val="90000"/>
-              </a:lnSpc>
-              <a:spcBef>
-                <a:spcPts val="500"/>
-              </a:spcBef>
-              <a:buFont typeface="Arial" panose="020B0604020202020204" pitchFamily="34" charset="0"/>
-              <a:buChar char="•"/>
-              <a:defRPr sz="1800" kern="1200">
-                <a:solidFill>
-                  <a:schemeClr val="tx1"/>
-                </a:solidFill>
-                <a:latin typeface="+mn-lt"/>
-                <a:ea typeface="+mn-ea"/>
-                <a:cs typeface="+mn-cs"/>
-              </a:defRPr>
-            </a:lvl7pPr>
-            <a:lvl8pPr marL="3429000" indent="-228600" algn="l" defTabSz="914400" rtl="0" eaLnBrk="1" latinLnBrk="0" hangingPunct="1">
-              <a:lnSpc>
-                <a:spcPct val="90000"/>
-              </a:lnSpc>
-              <a:spcBef>
-                <a:spcPts val="500"/>
-              </a:spcBef>
-              <a:buFont typeface="Arial" panose="020B0604020202020204" pitchFamily="34" charset="0"/>
-              <a:buChar char="•"/>
-              <a:defRPr sz="1800" kern="1200">
-                <a:solidFill>
-                  <a:schemeClr val="tx1"/>
-                </a:solidFill>
-                <a:latin typeface="+mn-lt"/>
-                <a:ea typeface="+mn-ea"/>
-                <a:cs typeface="+mn-cs"/>
-              </a:defRPr>
-            </a:lvl8pPr>
-            <a:lvl9pPr marL="3886200" indent="-228600" algn="l" defTabSz="914400" rtl="0" eaLnBrk="1" latinLnBrk="0" hangingPunct="1">
-              <a:lnSpc>
-                <a:spcPct val="90000"/>
-              </a:lnSpc>
-              <a:spcBef>
-                <a:spcPts val="500"/>
-              </a:spcBef>
-              <a:buFont typeface="Arial" panose="020B0604020202020204" pitchFamily="34" charset="0"/>
-              <a:buChar char="•"/>
-              <a:defRPr sz="1800" kern="1200">
-                <a:solidFill>
-                  <a:schemeClr val="tx1"/>
-                </a:solidFill>
-                <a:latin typeface="+mn-lt"/>
-                <a:ea typeface="+mn-ea"/>
-                <a:cs typeface="+mn-cs"/>
-              </a:defRPr>
-            </a:lvl9pPr>
-          </a:lstStyle>
+          <p:cNvPr id="2" name="Title 1">
+            <a:extLst>
+              <a:ext uri="{FF2B5EF4-FFF2-40B4-BE49-F238E27FC236}">
+                <a16:creationId xmlns:a16="http://schemas.microsoft.com/office/drawing/2014/main" id="{3FC0A6EC-04AA-5B45-94C0-FF1C4EFEF1BA}"/>
+              </a:ext>
+            </a:extLst>
+          </p:cNvPr>
+          <p:cNvSpPr>
+            <a:spLocks noGrp="1"/>
+          </p:cNvSpPr>
+          <p:nvPr>
+            <p:ph type="title"/>
+          </p:nvPr>
+        </p:nvSpPr>
+        <p:spPr/>
+        <p:txBody>
+          <a:bodyPr/>
+          <a:lstStyle/>
           <a:p>
             <a:r>
               <a:rPr lang="en-US" dirty="0"/>
-              <a:t>Select a file and view its commit history</a:t>
-            </a:r>
-          </a:p>
-          <a:p>
-            <a:endParaRPr lang="en-US" dirty="0"/>
-          </a:p>
-          <a:p>
-            <a:endParaRPr lang="en-US" dirty="0"/>
-          </a:p>
-          <a:p>
-            <a:pPr marL="0" indent="0">
-              <a:buNone/>
-            </a:pPr>
-            <a:endParaRPr lang="en-US" dirty="0"/>
-          </a:p>
-          <a:p>
-            <a:r>
-              <a:rPr lang="en-US" dirty="0"/>
-              <a:t>Or view an entire repo’s history</a:t>
-            </a:r>
-          </a:p>
-        </p:txBody>
-      </p:sp>
-      <p:sp>
-        <p:nvSpPr>
-          <p:cNvPr id="2" name="Title 1">
-            <a:extLst>
-              <a:ext uri="{FF2B5EF4-FFF2-40B4-BE49-F238E27FC236}">
-                <a16:creationId xmlns:a16="http://schemas.microsoft.com/office/drawing/2014/main" id="{3FC0A6EC-04AA-5B45-94C0-FF1C4EFEF1BA}"/>
-              </a:ext>
-            </a:extLst>
-          </p:cNvPr>
-          <p:cNvSpPr>
-            <a:spLocks noGrp="1"/>
-          </p:cNvSpPr>
-          <p:nvPr>
-            <p:ph type="title"/>
-          </p:nvPr>
-        </p:nvSpPr>
-        <p:spPr/>
-        <p:txBody>
-          <a:bodyPr/>
-          <a:lstStyle/>
-          <a:p>
-            <a:r>
-              <a:rPr lang="en-US" dirty="0"/>
-              <a:t>GitHub history</a:t>
+              <a:t>Working with GitHub</a:t>
             </a:r>
           </a:p>
         </p:txBody>
       </p:sp>
       <p:pic>
         <p:nvPicPr>
-          <p:cNvPr id="8" name="Content Placeholder 7">
-            <a:extLst>
-              <a:ext uri="{FF2B5EF4-FFF2-40B4-BE49-F238E27FC236}">
-                <a16:creationId xmlns:a16="http://schemas.microsoft.com/office/drawing/2014/main" id="{053A5626-799F-6B49-9A20-C9A6ECECE082}"/>
+          <p:cNvPr id="6" name="Picture 5">
+            <a:extLst>
+              <a:ext uri="{FF2B5EF4-FFF2-40B4-BE49-F238E27FC236}">
+                <a16:creationId xmlns:a16="http://schemas.microsoft.com/office/drawing/2014/main" id="{DB313856-E03C-7544-AC2B-ECDBAE422271}"/>
               </a:ext>
             </a:extLst>
           </p:cNvPr>
           <p:cNvPicPr>
-            <a:picLocks noGrp="1" noChangeAspect="1"/>
+            <a:picLocks noChangeAspect="1"/>
           </p:cNvPicPr>
-          <p:nvPr>
-            <p:ph idx="1"/>
-          </p:nvPr>
+          <p:nvPr/>
         </p:nvPicPr>
         <p:blipFill>
           <a:blip r:embed="rId2"/>
@@ -5932,17 +5246,20 @@
         </p:blipFill>
         <p:spPr>
           <a:xfrm>
-            <a:off x="1099457" y="1935539"/>
-            <a:ext cx="9285514" cy="1697415"/>
-          </a:xfrm>
+            <a:off x="25400" y="2074147"/>
+            <a:ext cx="11455400" cy="609600"/>
+          </a:xfrm>
+          <a:prstGeom prst="rect">
+            <a:avLst/>
+          </a:prstGeom>
         </p:spPr>
       </p:pic>
       <p:pic>
         <p:nvPicPr>
-          <p:cNvPr id="12" name="Picture 11">
-            <a:extLst>
-              <a:ext uri="{FF2B5EF4-FFF2-40B4-BE49-F238E27FC236}">
-                <a16:creationId xmlns:a16="http://schemas.microsoft.com/office/drawing/2014/main" id="{8D7C723A-30B9-514E-B9BC-23CFDD7BC175}"/>
+          <p:cNvPr id="9" name="Picture 8">
+            <a:extLst>
+              <a:ext uri="{FF2B5EF4-FFF2-40B4-BE49-F238E27FC236}">
+                <a16:creationId xmlns:a16="http://schemas.microsoft.com/office/drawing/2014/main" id="{737C7585-4061-AA4D-BEE5-8BA1FF2D6EF2}"/>
               </a:ext>
             </a:extLst>
           </p:cNvPr>
@@ -5959,107 +5276,20 @@
         </p:blipFill>
         <p:spPr>
           <a:xfrm>
-            <a:off x="979715" y="4021734"/>
-            <a:ext cx="9285514" cy="2466934"/>
+            <a:off x="25400" y="5517487"/>
+            <a:ext cx="12166600" cy="596900"/>
           </a:xfrm>
           <a:prstGeom prst="rect">
             <a:avLst/>
           </a:prstGeom>
         </p:spPr>
       </p:pic>
-    </p:spTree>
-    <p:extLst>
-      <p:ext uri="{BB962C8B-B14F-4D97-AF65-F5344CB8AC3E}">
-        <p14:creationId xmlns:p14="http://schemas.microsoft.com/office/powerpoint/2010/main" val="1657467888"/>
-      </p:ext>
-    </p:extLst>
-  </p:cSld>
-  <p:clrMapOvr>
-    <a:masterClrMapping/>
-  </p:clrMapOvr>
-</p:sld>
-</file>
-
-<file path=ppt/slides/slide16.xml><?xml version="1.0" encoding="utf-8"?>
-<p:sld xmlns:a="http://schemas.openxmlformats.org/drawingml/2006/main" xmlns:r="http://schemas.openxmlformats.org/officeDocument/2006/relationships" xmlns:p="http://schemas.openxmlformats.org/presentationml/2006/main">
-  <p:cSld>
-    <p:spTree>
-      <p:nvGrpSpPr>
-        <p:cNvPr id="1" name=""/>
-        <p:cNvGrpSpPr/>
-        <p:nvPr/>
-      </p:nvGrpSpPr>
-      <p:grpSpPr>
-        <a:xfrm>
-          <a:off x="0" y="0"/>
-          <a:ext cx="0" cy="0"/>
-          <a:chOff x="0" y="0"/>
-          <a:chExt cx="0" cy="0"/>
-        </a:xfrm>
-      </p:grpSpPr>
-      <p:sp>
-        <p:nvSpPr>
-          <p:cNvPr id="2" name="Title 1">
-            <a:extLst>
-              <a:ext uri="{FF2B5EF4-FFF2-40B4-BE49-F238E27FC236}">
-                <a16:creationId xmlns:a16="http://schemas.microsoft.com/office/drawing/2014/main" id="{3FC0A6EC-04AA-5B45-94C0-FF1C4EFEF1BA}"/>
-              </a:ext>
-            </a:extLst>
-          </p:cNvPr>
-          <p:cNvSpPr>
-            <a:spLocks noGrp="1"/>
-          </p:cNvSpPr>
-          <p:nvPr>
-            <p:ph type="title"/>
-          </p:nvPr>
-        </p:nvSpPr>
-        <p:spPr/>
-        <p:txBody>
-          <a:bodyPr/>
-          <a:lstStyle/>
-          <a:p>
-            <a:r>
-              <a:rPr lang="en-US" dirty="0"/>
-              <a:t>GitHub permissions</a:t>
-            </a:r>
-          </a:p>
-        </p:txBody>
-      </p:sp>
-      <p:pic>
-        <p:nvPicPr>
-          <p:cNvPr id="8" name="Content Placeholder 7">
-            <a:extLst>
-              <a:ext uri="{FF2B5EF4-FFF2-40B4-BE49-F238E27FC236}">
-                <a16:creationId xmlns:a16="http://schemas.microsoft.com/office/drawing/2014/main" id="{E8DF422C-FCA4-E545-951E-CD09884388BF}"/>
-              </a:ext>
-            </a:extLst>
-          </p:cNvPr>
-          <p:cNvPicPr>
-            <a:picLocks noGrp="1" noChangeAspect="1"/>
-          </p:cNvPicPr>
-          <p:nvPr>
-            <p:ph idx="1"/>
-          </p:nvPr>
-        </p:nvPicPr>
-        <p:blipFill>
-          <a:blip r:embed="rId2"/>
-          <a:stretch>
-            <a:fillRect/>
-          </a:stretch>
-        </p:blipFill>
-        <p:spPr>
-          <a:xfrm>
-            <a:off x="1031583" y="1690688"/>
-            <a:ext cx="10128834" cy="4784669"/>
-          </a:xfrm>
-        </p:spPr>
-      </p:pic>
-      <p:sp>
-        <p:nvSpPr>
-          <p:cNvPr id="9" name="Down Arrow 8">
-            <a:extLst>
-              <a:ext uri="{FF2B5EF4-FFF2-40B4-BE49-F238E27FC236}">
-                <a16:creationId xmlns:a16="http://schemas.microsoft.com/office/drawing/2014/main" id="{37DCA06B-3193-6F42-BC65-A0F400506774}"/>
+      <p:sp>
+        <p:nvSpPr>
+          <p:cNvPr id="12" name="Down Arrow 11">
+            <a:extLst>
+              <a:ext uri="{FF2B5EF4-FFF2-40B4-BE49-F238E27FC236}">
+                <a16:creationId xmlns:a16="http://schemas.microsoft.com/office/drawing/2014/main" id="{55DECEDF-4112-B247-8FE0-FC43B40A08C2}"/>
               </a:ext>
             </a:extLst>
           </p:cNvPr>
@@ -6068,8 +5298,8 @@
         </p:nvSpPr>
         <p:spPr>
           <a:xfrm>
-            <a:off x="6790903" y="1093219"/>
-            <a:ext cx="289931" cy="992459"/>
+            <a:off x="9952273" y="3129317"/>
+            <a:ext cx="289931" cy="609600"/>
           </a:xfrm>
           <a:prstGeom prst="downArrow">
             <a:avLst/>
@@ -6108,10 +5338,273 @@
           </a:p>
         </p:txBody>
       </p:sp>
+      <p:sp>
+        <p:nvSpPr>
+          <p:cNvPr id="13" name="Down Arrow 12">
+            <a:extLst>
+              <a:ext uri="{FF2B5EF4-FFF2-40B4-BE49-F238E27FC236}">
+                <a16:creationId xmlns:a16="http://schemas.microsoft.com/office/drawing/2014/main" id="{1B5FB6D1-5AC1-0B4A-915F-6A47F533BC09}"/>
+              </a:ext>
+            </a:extLst>
+          </p:cNvPr>
+          <p:cNvSpPr/>
+          <p:nvPr/>
+        </p:nvSpPr>
+        <p:spPr>
+          <a:xfrm>
+            <a:off x="9952272" y="1418870"/>
+            <a:ext cx="289931" cy="627592"/>
+          </a:xfrm>
+          <a:prstGeom prst="downArrow">
+            <a:avLst>
+              <a:gd name="adj1" fmla="val 50000"/>
+              <a:gd name="adj2" fmla="val 50000"/>
+            </a:avLst>
+          </a:prstGeom>
+          <a:solidFill>
+            <a:srgbClr val="C00000"/>
+          </a:solidFill>
+          <a:ln>
+            <a:solidFill>
+              <a:srgbClr val="C00000"/>
+            </a:solidFill>
+          </a:ln>
+        </p:spPr>
+        <p:style>
+          <a:lnRef idx="2">
+            <a:schemeClr val="accent1">
+              <a:shade val="50000"/>
+            </a:schemeClr>
+          </a:lnRef>
+          <a:fillRef idx="1">
+            <a:schemeClr val="accent1"/>
+          </a:fillRef>
+          <a:effectRef idx="0">
+            <a:schemeClr val="accent1"/>
+          </a:effectRef>
+          <a:fontRef idx="minor">
+            <a:schemeClr val="lt1"/>
+          </a:fontRef>
+        </p:style>
+        <p:txBody>
+          <a:bodyPr rtlCol="0" anchor="ctr"/>
+          <a:lstStyle/>
+          <a:p>
+            <a:pPr algn="ctr"/>
+            <a:endParaRPr lang="en-US"/>
+          </a:p>
+        </p:txBody>
+      </p:sp>
+      <p:pic>
+        <p:nvPicPr>
+          <p:cNvPr id="16" name="Picture 15">
+            <a:extLst>
+              <a:ext uri="{FF2B5EF4-FFF2-40B4-BE49-F238E27FC236}">
+                <a16:creationId xmlns:a16="http://schemas.microsoft.com/office/drawing/2014/main" id="{34AD2183-5A45-DD42-BF5F-6A14E07A2CD7}"/>
+              </a:ext>
+            </a:extLst>
+          </p:cNvPr>
+          <p:cNvPicPr>
+            <a:picLocks noChangeAspect="1"/>
+          </p:cNvPicPr>
+          <p:nvPr/>
+        </p:nvPicPr>
+        <p:blipFill>
+          <a:blip r:embed="rId4"/>
+          <a:stretch>
+            <a:fillRect/>
+          </a:stretch>
+        </p:blipFill>
+        <p:spPr>
+          <a:xfrm>
+            <a:off x="0" y="3784594"/>
+            <a:ext cx="12115800" cy="609600"/>
+          </a:xfrm>
+          <a:prstGeom prst="rect">
+            <a:avLst/>
+          </a:prstGeom>
+        </p:spPr>
+      </p:pic>
+      <p:sp>
+        <p:nvSpPr>
+          <p:cNvPr id="17" name="TextBox 16">
+            <a:extLst>
+              <a:ext uri="{FF2B5EF4-FFF2-40B4-BE49-F238E27FC236}">
+                <a16:creationId xmlns:a16="http://schemas.microsoft.com/office/drawing/2014/main" id="{19E7BD0B-71D2-AD41-902D-A20FE316BD5C}"/>
+              </a:ext>
+            </a:extLst>
+          </p:cNvPr>
+          <p:cNvSpPr txBox="1"/>
+          <p:nvPr/>
+        </p:nvSpPr>
+        <p:spPr>
+          <a:xfrm>
+            <a:off x="6322741" y="3022582"/>
+            <a:ext cx="3629531" cy="646331"/>
+          </a:xfrm>
+          <a:prstGeom prst="rect">
+            <a:avLst/>
+          </a:prstGeom>
+          <a:noFill/>
+        </p:spPr>
+        <p:txBody>
+          <a:bodyPr wrap="square" rtlCol="0">
+            <a:spAutoFit/>
+          </a:bodyPr>
+          <a:lstStyle/>
+          <a:p>
+            <a:pPr algn="r"/>
+            <a:r>
+              <a:rPr lang="en-US" dirty="0"/>
+              <a:t>Local copy does not match GitHub.</a:t>
+            </a:r>
+          </a:p>
+          <a:p>
+            <a:pPr algn="r"/>
+            <a:r>
+              <a:rPr lang="en-US" dirty="0"/>
+              <a:t>Click to update GitHub</a:t>
+            </a:r>
+          </a:p>
+        </p:txBody>
+      </p:sp>
+      <p:sp>
+        <p:nvSpPr>
+          <p:cNvPr id="18" name="TextBox 17">
+            <a:extLst>
+              <a:ext uri="{FF2B5EF4-FFF2-40B4-BE49-F238E27FC236}">
+                <a16:creationId xmlns:a16="http://schemas.microsoft.com/office/drawing/2014/main" id="{44F6B97C-0A35-8E4D-948F-7784C3C874BB}"/>
+              </a:ext>
+            </a:extLst>
+          </p:cNvPr>
+          <p:cNvSpPr txBox="1"/>
+          <p:nvPr/>
+        </p:nvSpPr>
+        <p:spPr>
+          <a:xfrm>
+            <a:off x="6322741" y="1365566"/>
+            <a:ext cx="3629531" cy="369332"/>
+          </a:xfrm>
+          <a:prstGeom prst="rect">
+            <a:avLst/>
+          </a:prstGeom>
+          <a:noFill/>
+        </p:spPr>
+        <p:txBody>
+          <a:bodyPr wrap="square" rtlCol="0">
+            <a:spAutoFit/>
+          </a:bodyPr>
+          <a:lstStyle/>
+          <a:p>
+            <a:pPr algn="r"/>
+            <a:r>
+              <a:rPr lang="en-US" dirty="0"/>
+              <a:t>Check if local and GitHub match</a:t>
+            </a:r>
+          </a:p>
+        </p:txBody>
+      </p:sp>
+      <p:sp>
+        <p:nvSpPr>
+          <p:cNvPr id="19" name="Down Arrow 18">
+            <a:extLst>
+              <a:ext uri="{FF2B5EF4-FFF2-40B4-BE49-F238E27FC236}">
+                <a16:creationId xmlns:a16="http://schemas.microsoft.com/office/drawing/2014/main" id="{99BF6709-EAF3-B241-885E-D09C07494C7A}"/>
+              </a:ext>
+            </a:extLst>
+          </p:cNvPr>
+          <p:cNvSpPr/>
+          <p:nvPr/>
+        </p:nvSpPr>
+        <p:spPr>
+          <a:xfrm>
+            <a:off x="9952272" y="4861906"/>
+            <a:ext cx="289931" cy="569178"/>
+          </a:xfrm>
+          <a:prstGeom prst="downArrow">
+            <a:avLst/>
+          </a:prstGeom>
+          <a:solidFill>
+            <a:srgbClr val="C00000"/>
+          </a:solidFill>
+          <a:ln>
+            <a:solidFill>
+              <a:srgbClr val="C00000"/>
+            </a:solidFill>
+          </a:ln>
+        </p:spPr>
+        <p:style>
+          <a:lnRef idx="2">
+            <a:schemeClr val="accent1">
+              <a:shade val="50000"/>
+            </a:schemeClr>
+          </a:lnRef>
+          <a:fillRef idx="1">
+            <a:schemeClr val="accent1"/>
+          </a:fillRef>
+          <a:effectRef idx="0">
+            <a:schemeClr val="accent1"/>
+          </a:effectRef>
+          <a:fontRef idx="minor">
+            <a:schemeClr val="lt1"/>
+          </a:fontRef>
+        </p:style>
+        <p:txBody>
+          <a:bodyPr rtlCol="0" anchor="ctr"/>
+          <a:lstStyle/>
+          <a:p>
+            <a:pPr algn="ctr"/>
+            <a:endParaRPr lang="en-US"/>
+          </a:p>
+        </p:txBody>
+      </p:sp>
+      <p:sp>
+        <p:nvSpPr>
+          <p:cNvPr id="20" name="TextBox 19">
+            <a:extLst>
+              <a:ext uri="{FF2B5EF4-FFF2-40B4-BE49-F238E27FC236}">
+                <a16:creationId xmlns:a16="http://schemas.microsoft.com/office/drawing/2014/main" id="{0028DD9F-D597-AA4F-8F5F-A9A43ADA01C0}"/>
+              </a:ext>
+            </a:extLst>
+          </p:cNvPr>
+          <p:cNvSpPr txBox="1"/>
+          <p:nvPr/>
+        </p:nvSpPr>
+        <p:spPr>
+          <a:xfrm>
+            <a:off x="6322741" y="4750188"/>
+            <a:ext cx="3629531" cy="646331"/>
+          </a:xfrm>
+          <a:prstGeom prst="rect">
+            <a:avLst/>
+          </a:prstGeom>
+          <a:noFill/>
+        </p:spPr>
+        <p:txBody>
+          <a:bodyPr wrap="square" rtlCol="0">
+            <a:spAutoFit/>
+          </a:bodyPr>
+          <a:lstStyle/>
+          <a:p>
+            <a:pPr algn="r"/>
+            <a:r>
+              <a:rPr lang="en-US" dirty="0"/>
+              <a:t>Local copy does not match GitHub.</a:t>
+            </a:r>
+          </a:p>
+          <a:p>
+            <a:pPr algn="r"/>
+            <a:r>
+              <a:rPr lang="en-US" dirty="0"/>
+              <a:t>Click to update local</a:t>
+            </a:r>
+          </a:p>
+        </p:txBody>
+      </p:sp>
     </p:spTree>
     <p:extLst>
       <p:ext uri="{BB962C8B-B14F-4D97-AF65-F5344CB8AC3E}">
-        <p14:creationId xmlns:p14="http://schemas.microsoft.com/office/powerpoint/2010/main" val="360141150"/>
+        <p14:creationId xmlns:p14="http://schemas.microsoft.com/office/powerpoint/2010/main" val="2094645739"/>
       </p:ext>
     </p:extLst>
   </p:cSld>
@@ -6161,6 +5654,244 @@
           <a:p>
             <a:r>
               <a:rPr lang="en-US" dirty="0"/>
+              <a:t>Setup</a:t>
+            </a:r>
+          </a:p>
+        </p:txBody>
+      </p:sp>
+      <p:sp>
+        <p:nvSpPr>
+          <p:cNvPr id="3" name="Text Placeholder 2">
+            <a:extLst>
+              <a:ext uri="{FF2B5EF4-FFF2-40B4-BE49-F238E27FC236}">
+                <a16:creationId xmlns:a16="http://schemas.microsoft.com/office/drawing/2014/main" id="{0B4A29AB-1C6F-D14A-9BDF-00FDEB7A8653}"/>
+              </a:ext>
+            </a:extLst>
+          </p:cNvPr>
+          <p:cNvSpPr>
+            <a:spLocks noGrp="1"/>
+          </p:cNvSpPr>
+          <p:nvPr>
+            <p:ph type="body" idx="1"/>
+          </p:nvPr>
+        </p:nvSpPr>
+        <p:spPr/>
+        <p:txBody>
+          <a:bodyPr/>
+          <a:lstStyle/>
+          <a:p>
+            <a:endParaRPr lang="en-US" dirty="0"/>
+          </a:p>
+        </p:txBody>
+      </p:sp>
+    </p:spTree>
+    <p:extLst>
+      <p:ext uri="{BB962C8B-B14F-4D97-AF65-F5344CB8AC3E}">
+        <p14:creationId xmlns:p14="http://schemas.microsoft.com/office/powerpoint/2010/main" val="3281584327"/>
+      </p:ext>
+    </p:extLst>
+  </p:cSld>
+  <p:clrMapOvr>
+    <a:masterClrMapping/>
+  </p:clrMapOvr>
+</p:sld>
+</file>
+
+<file path=ppt/slides/slide3.xml><?xml version="1.0" encoding="utf-8"?>
+<p:sld xmlns:a="http://schemas.openxmlformats.org/drawingml/2006/main" xmlns:r="http://schemas.openxmlformats.org/officeDocument/2006/relationships" xmlns:p="http://schemas.openxmlformats.org/presentationml/2006/main">
+  <p:cSld>
+    <p:spTree>
+      <p:nvGrpSpPr>
+        <p:cNvPr id="1" name=""/>
+        <p:cNvGrpSpPr/>
+        <p:nvPr/>
+      </p:nvGrpSpPr>
+      <p:grpSpPr>
+        <a:xfrm>
+          <a:off x="0" y="0"/>
+          <a:ext cx="0" cy="0"/>
+          <a:chOff x="0" y="0"/>
+          <a:chExt cx="0" cy="0"/>
+        </a:xfrm>
+      </p:grpSpPr>
+      <p:pic>
+        <p:nvPicPr>
+          <p:cNvPr id="5" name="Picture 4">
+            <a:extLst>
+              <a:ext uri="{FF2B5EF4-FFF2-40B4-BE49-F238E27FC236}">
+                <a16:creationId xmlns:a16="http://schemas.microsoft.com/office/drawing/2014/main" id="{4FE177E0-7A57-8B40-8787-A97B5BAE90CF}"/>
+              </a:ext>
+            </a:extLst>
+          </p:cNvPr>
+          <p:cNvPicPr>
+            <a:picLocks noChangeAspect="1"/>
+          </p:cNvPicPr>
+          <p:nvPr/>
+        </p:nvPicPr>
+        <p:blipFill>
+          <a:blip r:embed="rId2"/>
+          <a:stretch>
+            <a:fillRect/>
+          </a:stretch>
+        </p:blipFill>
+        <p:spPr>
+          <a:xfrm>
+            <a:off x="439486" y="2172045"/>
+            <a:ext cx="5656514" cy="4191096"/>
+          </a:xfrm>
+          <a:prstGeom prst="rect">
+            <a:avLst/>
+          </a:prstGeom>
+        </p:spPr>
+      </p:pic>
+      <p:sp>
+        <p:nvSpPr>
+          <p:cNvPr id="6" name="Title 1">
+            <a:extLst>
+              <a:ext uri="{FF2B5EF4-FFF2-40B4-BE49-F238E27FC236}">
+                <a16:creationId xmlns:a16="http://schemas.microsoft.com/office/drawing/2014/main" id="{293645AD-7C61-C248-A62C-9FD0E35A8AEC}"/>
+              </a:ext>
+            </a:extLst>
+          </p:cNvPr>
+          <p:cNvSpPr>
+            <a:spLocks noGrp="1"/>
+          </p:cNvSpPr>
+          <p:nvPr>
+            <p:ph type="title"/>
+          </p:nvPr>
+        </p:nvSpPr>
+        <p:spPr>
+          <a:xfrm>
+            <a:off x="838200" y="365125"/>
+            <a:ext cx="10515600" cy="738461"/>
+          </a:xfrm>
+        </p:spPr>
+        <p:txBody>
+          <a:bodyPr>
+            <a:normAutofit/>
+          </a:bodyPr>
+          <a:lstStyle/>
+          <a:p>
+            <a:r>
+              <a:rPr lang="en-US" sz="4400" dirty="0"/>
+              <a:t>Set name, link to GitHub</a:t>
+            </a:r>
+          </a:p>
+        </p:txBody>
+      </p:sp>
+      <p:pic>
+        <p:nvPicPr>
+          <p:cNvPr id="8" name="Picture 7">
+            <a:extLst>
+              <a:ext uri="{FF2B5EF4-FFF2-40B4-BE49-F238E27FC236}">
+                <a16:creationId xmlns:a16="http://schemas.microsoft.com/office/drawing/2014/main" id="{A0BBCD1B-B5DB-6643-BD70-455B4EC6FE7C}"/>
+              </a:ext>
+            </a:extLst>
+          </p:cNvPr>
+          <p:cNvPicPr>
+            <a:picLocks noChangeAspect="1"/>
+          </p:cNvPicPr>
+          <p:nvPr/>
+        </p:nvPicPr>
+        <p:blipFill>
+          <a:blip r:embed="rId3"/>
+          <a:stretch>
+            <a:fillRect/>
+          </a:stretch>
+        </p:blipFill>
+        <p:spPr>
+          <a:xfrm>
+            <a:off x="6589034" y="100359"/>
+            <a:ext cx="5328367" cy="2912841"/>
+          </a:xfrm>
+          <a:prstGeom prst="rect">
+            <a:avLst/>
+          </a:prstGeom>
+        </p:spPr>
+      </p:pic>
+      <p:pic>
+        <p:nvPicPr>
+          <p:cNvPr id="10" name="Picture 9">
+            <a:extLst>
+              <a:ext uri="{FF2B5EF4-FFF2-40B4-BE49-F238E27FC236}">
+                <a16:creationId xmlns:a16="http://schemas.microsoft.com/office/drawing/2014/main" id="{FA1D9964-0E71-E343-A4A1-3A32FD551722}"/>
+              </a:ext>
+            </a:extLst>
+          </p:cNvPr>
+          <p:cNvPicPr>
+            <a:picLocks noChangeAspect="1"/>
+          </p:cNvPicPr>
+          <p:nvPr/>
+        </p:nvPicPr>
+        <p:blipFill>
+          <a:blip r:embed="rId4"/>
+          <a:stretch>
+            <a:fillRect/>
+          </a:stretch>
+        </p:blipFill>
+        <p:spPr>
+          <a:xfrm>
+            <a:off x="6590372" y="3213088"/>
+            <a:ext cx="5327030" cy="3495029"/>
+          </a:xfrm>
+          <a:prstGeom prst="rect">
+            <a:avLst/>
+          </a:prstGeom>
+        </p:spPr>
+      </p:pic>
+    </p:spTree>
+    <p:extLst>
+      <p:ext uri="{BB962C8B-B14F-4D97-AF65-F5344CB8AC3E}">
+        <p14:creationId xmlns:p14="http://schemas.microsoft.com/office/powerpoint/2010/main" val="168286166"/>
+      </p:ext>
+    </p:extLst>
+  </p:cSld>
+  <p:clrMapOvr>
+    <a:masterClrMapping/>
+  </p:clrMapOvr>
+</p:sld>
+</file>
+
+<file path=ppt/slides/slide4.xml><?xml version="1.0" encoding="utf-8"?>
+<p:sld xmlns:a="http://schemas.openxmlformats.org/drawingml/2006/main" xmlns:r="http://schemas.openxmlformats.org/officeDocument/2006/relationships" xmlns:p="http://schemas.openxmlformats.org/presentationml/2006/main">
+  <p:cSld>
+    <p:spTree>
+      <p:nvGrpSpPr>
+        <p:cNvPr id="1" name=""/>
+        <p:cNvGrpSpPr/>
+        <p:nvPr/>
+      </p:nvGrpSpPr>
+      <p:grpSpPr>
+        <a:xfrm>
+          <a:off x="0" y="0"/>
+          <a:ext cx="0" cy="0"/>
+          <a:chOff x="0" y="0"/>
+          <a:chExt cx="0" cy="0"/>
+        </a:xfrm>
+      </p:grpSpPr>
+      <p:sp>
+        <p:nvSpPr>
+          <p:cNvPr id="2" name="Title 1">
+            <a:extLst>
+              <a:ext uri="{FF2B5EF4-FFF2-40B4-BE49-F238E27FC236}">
+                <a16:creationId xmlns:a16="http://schemas.microsoft.com/office/drawing/2014/main" id="{DD80D402-4B0A-DA49-B9D3-BCE9C075E7F8}"/>
+              </a:ext>
+            </a:extLst>
+          </p:cNvPr>
+          <p:cNvSpPr>
+            <a:spLocks noGrp="1"/>
+          </p:cNvSpPr>
+          <p:nvPr>
+            <p:ph type="title"/>
+          </p:nvPr>
+        </p:nvSpPr>
+        <p:spPr/>
+        <p:txBody>
+          <a:bodyPr/>
+          <a:lstStyle/>
+          <a:p>
+            <a:r>
+              <a:rPr lang="en-US" dirty="0"/>
               <a:t>Collaborate with yourself</a:t>
             </a:r>
           </a:p>
@@ -6207,7 +5938,7 @@
 </p:sld>
 </file>
 
-<file path=ppt/slides/slide3.xml><?xml version="1.0" encoding="utf-8"?>
+<file path=ppt/slides/slide5.xml><?xml version="1.0" encoding="utf-8"?>
 <p:sld xmlns:a="http://schemas.openxmlformats.org/drawingml/2006/main" xmlns:r="http://schemas.openxmlformats.org/officeDocument/2006/relationships" xmlns:p="http://schemas.openxmlformats.org/presentationml/2006/main">
   <p:cSld>
     <p:spTree>
@@ -6398,7 +6129,7 @@
 </p:sld>
 </file>
 
-<file path=ppt/slides/slide4.xml><?xml version="1.0" encoding="utf-8"?>
+<file path=ppt/slides/slide6.xml><?xml version="1.0" encoding="utf-8"?>
 <p:sld xmlns:a="http://schemas.openxmlformats.org/drawingml/2006/main" xmlns:r="http://schemas.openxmlformats.org/officeDocument/2006/relationships" xmlns:p="http://schemas.openxmlformats.org/presentationml/2006/main">
   <p:cSld>
     <p:spTree>
@@ -6810,959 +6541,6 @@
 </p:sld>
 </file>
 
-<file path=ppt/slides/slide5.xml><?xml version="1.0" encoding="utf-8"?>
-<p:sld xmlns:a="http://schemas.openxmlformats.org/drawingml/2006/main" xmlns:r="http://schemas.openxmlformats.org/officeDocument/2006/relationships" xmlns:p="http://schemas.openxmlformats.org/presentationml/2006/main">
-  <p:cSld>
-    <p:spTree>
-      <p:nvGrpSpPr>
-        <p:cNvPr id="1" name=""/>
-        <p:cNvGrpSpPr/>
-        <p:nvPr/>
-      </p:nvGrpSpPr>
-      <p:grpSpPr>
-        <a:xfrm>
-          <a:off x="0" y="0"/>
-          <a:ext cx="0" cy="0"/>
-          <a:chOff x="0" y="0"/>
-          <a:chExt cx="0" cy="0"/>
-        </a:xfrm>
-      </p:grpSpPr>
-      <p:sp>
-        <p:nvSpPr>
-          <p:cNvPr id="2" name="Title 1">
-            <a:extLst>
-              <a:ext uri="{FF2B5EF4-FFF2-40B4-BE49-F238E27FC236}">
-                <a16:creationId xmlns:a16="http://schemas.microsoft.com/office/drawing/2014/main" id="{209B4A58-19B9-2346-A1F8-D57355C7BC8B}"/>
-              </a:ext>
-            </a:extLst>
-          </p:cNvPr>
-          <p:cNvSpPr>
-            <a:spLocks noGrp="1"/>
-          </p:cNvSpPr>
-          <p:nvPr>
-            <p:ph type="title"/>
-          </p:nvPr>
-        </p:nvSpPr>
-        <p:spPr/>
-        <p:txBody>
-          <a:bodyPr/>
-          <a:lstStyle/>
-          <a:p>
-            <a:r>
-              <a:rPr lang="en-US" dirty="0"/>
-              <a:t>Create a new repository</a:t>
-            </a:r>
-          </a:p>
-        </p:txBody>
-      </p:sp>
-      <p:pic>
-        <p:nvPicPr>
-          <p:cNvPr id="10" name="Content Placeholder 9">
-            <a:extLst>
-              <a:ext uri="{FF2B5EF4-FFF2-40B4-BE49-F238E27FC236}">
-                <a16:creationId xmlns:a16="http://schemas.microsoft.com/office/drawing/2014/main" id="{BE9C3043-D92B-C540-A935-2FCA7C028436}"/>
-              </a:ext>
-            </a:extLst>
-          </p:cNvPr>
-          <p:cNvPicPr>
-            <a:picLocks noGrp="1" noChangeAspect="1"/>
-          </p:cNvPicPr>
-          <p:nvPr>
-            <p:ph idx="1"/>
-          </p:nvPr>
-        </p:nvPicPr>
-        <p:blipFill rotWithShape="1">
-          <a:blip r:embed="rId2"/>
-          <a:srcRect r="15896"/>
-          <a:stretch/>
-        </p:blipFill>
-        <p:spPr>
-          <a:xfrm>
-            <a:off x="302941" y="1611217"/>
-            <a:ext cx="5618356" cy="1524000"/>
-          </a:xfrm>
-        </p:spPr>
-      </p:pic>
-      <p:pic>
-        <p:nvPicPr>
-          <p:cNvPr id="12" name="Picture 11">
-            <a:extLst>
-              <a:ext uri="{FF2B5EF4-FFF2-40B4-BE49-F238E27FC236}">
-                <a16:creationId xmlns:a16="http://schemas.microsoft.com/office/drawing/2014/main" id="{860F1E60-DBA3-7448-965B-949C1425492A}"/>
-              </a:ext>
-            </a:extLst>
-          </p:cNvPr>
-          <p:cNvPicPr>
-            <a:picLocks noChangeAspect="1"/>
-          </p:cNvPicPr>
-          <p:nvPr/>
-        </p:nvPicPr>
-        <p:blipFill>
-          <a:blip r:embed="rId3"/>
-          <a:stretch>
-            <a:fillRect/>
-          </a:stretch>
-        </p:blipFill>
-        <p:spPr>
-          <a:xfrm>
-            <a:off x="6576277" y="737218"/>
-            <a:ext cx="5016500" cy="5740400"/>
-          </a:xfrm>
-          <a:prstGeom prst="rect">
-            <a:avLst/>
-          </a:prstGeom>
-        </p:spPr>
-      </p:pic>
-      <p:sp>
-        <p:nvSpPr>
-          <p:cNvPr id="13" name="Down Arrow 12">
-            <a:extLst>
-              <a:ext uri="{FF2B5EF4-FFF2-40B4-BE49-F238E27FC236}">
-                <a16:creationId xmlns:a16="http://schemas.microsoft.com/office/drawing/2014/main" id="{50C50D1B-9271-3C4F-8D55-0308D909156E}"/>
-              </a:ext>
-            </a:extLst>
-          </p:cNvPr>
-          <p:cNvSpPr/>
-          <p:nvPr/>
-        </p:nvSpPr>
-        <p:spPr>
-          <a:xfrm rot="16200000" flipH="1">
-            <a:off x="6114972" y="3403257"/>
-            <a:ext cx="289931" cy="992459"/>
-          </a:xfrm>
-          <a:prstGeom prst="downArrow">
-            <a:avLst/>
-          </a:prstGeom>
-          <a:solidFill>
-            <a:srgbClr val="C00000"/>
-          </a:solidFill>
-          <a:ln>
-            <a:solidFill>
-              <a:srgbClr val="C00000"/>
-            </a:solidFill>
-          </a:ln>
-        </p:spPr>
-        <p:style>
-          <a:lnRef idx="2">
-            <a:schemeClr val="accent1">
-              <a:shade val="50000"/>
-            </a:schemeClr>
-          </a:lnRef>
-          <a:fillRef idx="1">
-            <a:schemeClr val="accent1"/>
-          </a:fillRef>
-          <a:effectRef idx="0">
-            <a:schemeClr val="accent1"/>
-          </a:effectRef>
-          <a:fontRef idx="minor">
-            <a:schemeClr val="lt1"/>
-          </a:fontRef>
-        </p:style>
-        <p:txBody>
-          <a:bodyPr rtlCol="0" anchor="ctr"/>
-          <a:lstStyle/>
-          <a:p>
-            <a:pPr algn="ctr"/>
-            <a:endParaRPr lang="en-US" dirty="0"/>
-          </a:p>
-        </p:txBody>
-      </p:sp>
-      <p:sp>
-        <p:nvSpPr>
-          <p:cNvPr id="14" name="TextBox 13">
-            <a:extLst>
-              <a:ext uri="{FF2B5EF4-FFF2-40B4-BE49-F238E27FC236}">
-                <a16:creationId xmlns:a16="http://schemas.microsoft.com/office/drawing/2014/main" id="{6A91A383-386A-3349-9986-6C17933CFC9B}"/>
-              </a:ext>
-            </a:extLst>
-          </p:cNvPr>
-          <p:cNvSpPr txBox="1"/>
-          <p:nvPr/>
-        </p:nvSpPr>
-        <p:spPr>
-          <a:xfrm>
-            <a:off x="3379903" y="3714820"/>
-            <a:ext cx="2383805" cy="369332"/>
-          </a:xfrm>
-          <a:prstGeom prst="rect">
-            <a:avLst/>
-          </a:prstGeom>
-          <a:noFill/>
-        </p:spPr>
-        <p:txBody>
-          <a:bodyPr wrap="square" rtlCol="0">
-            <a:spAutoFit/>
-          </a:bodyPr>
-          <a:lstStyle/>
-          <a:p>
-            <a:pPr algn="r"/>
-            <a:r>
-              <a:rPr lang="en-US" dirty="0"/>
-              <a:t>Always have a README</a:t>
-            </a:r>
-          </a:p>
-        </p:txBody>
-      </p:sp>
-      <p:sp>
-        <p:nvSpPr>
-          <p:cNvPr id="15" name="Down Arrow 14">
-            <a:extLst>
-              <a:ext uri="{FF2B5EF4-FFF2-40B4-BE49-F238E27FC236}">
-                <a16:creationId xmlns:a16="http://schemas.microsoft.com/office/drawing/2014/main" id="{71AB9BAE-5210-0F48-805C-94CA4E6BAE4A}"/>
-              </a:ext>
-            </a:extLst>
-          </p:cNvPr>
-          <p:cNvSpPr/>
-          <p:nvPr/>
-        </p:nvSpPr>
-        <p:spPr>
-          <a:xfrm rot="16200000" flipH="1">
-            <a:off x="6103821" y="4015622"/>
-            <a:ext cx="289931" cy="992459"/>
-          </a:xfrm>
-          <a:prstGeom prst="downArrow">
-            <a:avLst/>
-          </a:prstGeom>
-          <a:solidFill>
-            <a:srgbClr val="C00000"/>
-          </a:solidFill>
-          <a:ln>
-            <a:solidFill>
-              <a:srgbClr val="C00000"/>
-            </a:solidFill>
-          </a:ln>
-        </p:spPr>
-        <p:style>
-          <a:lnRef idx="2">
-            <a:schemeClr val="accent1">
-              <a:shade val="50000"/>
-            </a:schemeClr>
-          </a:lnRef>
-          <a:fillRef idx="1">
-            <a:schemeClr val="accent1"/>
-          </a:fillRef>
-          <a:effectRef idx="0">
-            <a:schemeClr val="accent1"/>
-          </a:effectRef>
-          <a:fontRef idx="minor">
-            <a:schemeClr val="lt1"/>
-          </a:fontRef>
-        </p:style>
-        <p:txBody>
-          <a:bodyPr rtlCol="0" anchor="ctr"/>
-          <a:lstStyle/>
-          <a:p>
-            <a:pPr algn="ctr"/>
-            <a:endParaRPr lang="en-US"/>
-          </a:p>
-        </p:txBody>
-      </p:sp>
-      <p:sp>
-        <p:nvSpPr>
-          <p:cNvPr id="16" name="TextBox 15">
-            <a:extLst>
-              <a:ext uri="{FF2B5EF4-FFF2-40B4-BE49-F238E27FC236}">
-                <a16:creationId xmlns:a16="http://schemas.microsoft.com/office/drawing/2014/main" id="{EB6A63F2-863D-BA4B-9338-22314ED30C2B}"/>
-              </a:ext>
-            </a:extLst>
-          </p:cNvPr>
-          <p:cNvSpPr txBox="1"/>
-          <p:nvPr/>
-        </p:nvSpPr>
-        <p:spPr>
-          <a:xfrm>
-            <a:off x="2096429" y="4226600"/>
-            <a:ext cx="3656128" cy="646331"/>
-          </a:xfrm>
-          <a:prstGeom prst="rect">
-            <a:avLst/>
-          </a:prstGeom>
-          <a:noFill/>
-        </p:spPr>
-        <p:txBody>
-          <a:bodyPr wrap="square" rtlCol="0">
-            <a:spAutoFit/>
-          </a:bodyPr>
-          <a:lstStyle/>
-          <a:p>
-            <a:pPr algn="r"/>
-            <a:r>
-              <a:rPr lang="en-US" dirty="0"/>
-              <a:t>Optionally auto generate common ignored files for different programs</a:t>
-            </a:r>
-          </a:p>
-        </p:txBody>
-      </p:sp>
-      <p:sp>
-        <p:nvSpPr>
-          <p:cNvPr id="17" name="Down Arrow 16">
-            <a:extLst>
-              <a:ext uri="{FF2B5EF4-FFF2-40B4-BE49-F238E27FC236}">
-                <a16:creationId xmlns:a16="http://schemas.microsoft.com/office/drawing/2014/main" id="{4248D804-8751-CD4C-AC7A-81184F6DF6EF}"/>
-              </a:ext>
-            </a:extLst>
-          </p:cNvPr>
-          <p:cNvSpPr/>
-          <p:nvPr/>
-        </p:nvSpPr>
-        <p:spPr>
-          <a:xfrm rot="16200000" flipH="1">
-            <a:off x="6103821" y="4794221"/>
-            <a:ext cx="289931" cy="992459"/>
-          </a:xfrm>
-          <a:prstGeom prst="downArrow">
-            <a:avLst/>
-          </a:prstGeom>
-          <a:solidFill>
-            <a:srgbClr val="C00000"/>
-          </a:solidFill>
-          <a:ln>
-            <a:solidFill>
-              <a:srgbClr val="C00000"/>
-            </a:solidFill>
-          </a:ln>
-        </p:spPr>
-        <p:style>
-          <a:lnRef idx="2">
-            <a:schemeClr val="accent1">
-              <a:shade val="50000"/>
-            </a:schemeClr>
-          </a:lnRef>
-          <a:fillRef idx="1">
-            <a:schemeClr val="accent1"/>
-          </a:fillRef>
-          <a:effectRef idx="0">
-            <a:schemeClr val="accent1"/>
-          </a:effectRef>
-          <a:fontRef idx="minor">
-            <a:schemeClr val="lt1"/>
-          </a:fontRef>
-        </p:style>
-        <p:txBody>
-          <a:bodyPr rtlCol="0" anchor="ctr"/>
-          <a:lstStyle/>
-          <a:p>
-            <a:pPr algn="ctr"/>
-            <a:endParaRPr lang="en-US"/>
-          </a:p>
-        </p:txBody>
-      </p:sp>
-      <p:sp>
-        <p:nvSpPr>
-          <p:cNvPr id="18" name="TextBox 17">
-            <a:extLst>
-              <a:ext uri="{FF2B5EF4-FFF2-40B4-BE49-F238E27FC236}">
-                <a16:creationId xmlns:a16="http://schemas.microsoft.com/office/drawing/2014/main" id="{7D97E75E-9FFB-0F47-9497-ED9A329C5976}"/>
-              </a:ext>
-            </a:extLst>
-          </p:cNvPr>
-          <p:cNvSpPr txBox="1"/>
-          <p:nvPr/>
-        </p:nvSpPr>
-        <p:spPr>
-          <a:xfrm>
-            <a:off x="2877015" y="5002582"/>
-            <a:ext cx="2875542" cy="646331"/>
-          </a:xfrm>
-          <a:prstGeom prst="rect">
-            <a:avLst/>
-          </a:prstGeom>
-          <a:noFill/>
-        </p:spPr>
-        <p:txBody>
-          <a:bodyPr wrap="square" rtlCol="0">
-            <a:spAutoFit/>
-          </a:bodyPr>
-          <a:lstStyle/>
-          <a:p>
-            <a:pPr algn="r"/>
-            <a:r>
-              <a:rPr lang="en-US" dirty="0"/>
-              <a:t>Add license so others can use your code if made public</a:t>
-            </a:r>
-          </a:p>
-        </p:txBody>
-      </p:sp>
-    </p:spTree>
-    <p:extLst>
-      <p:ext uri="{BB962C8B-B14F-4D97-AF65-F5344CB8AC3E}">
-        <p14:creationId xmlns:p14="http://schemas.microsoft.com/office/powerpoint/2010/main" val="2368947156"/>
-      </p:ext>
-    </p:extLst>
-  </p:cSld>
-  <p:clrMapOvr>
-    <a:masterClrMapping/>
-  </p:clrMapOvr>
-</p:sld>
-</file>
-
-<file path=ppt/slides/slide6.xml><?xml version="1.0" encoding="utf-8"?>
-<p:sld xmlns:a="http://schemas.openxmlformats.org/drawingml/2006/main" xmlns:r="http://schemas.openxmlformats.org/officeDocument/2006/relationships" xmlns:p="http://schemas.openxmlformats.org/presentationml/2006/main">
-  <p:cSld>
-    <p:spTree>
-      <p:nvGrpSpPr>
-        <p:cNvPr id="1" name=""/>
-        <p:cNvGrpSpPr/>
-        <p:nvPr/>
-      </p:nvGrpSpPr>
-      <p:grpSpPr>
-        <a:xfrm>
-          <a:off x="0" y="0"/>
-          <a:ext cx="0" cy="0"/>
-          <a:chOff x="0" y="0"/>
-          <a:chExt cx="0" cy="0"/>
-        </a:xfrm>
-      </p:grpSpPr>
-      <p:sp>
-        <p:nvSpPr>
-          <p:cNvPr id="2" name="Title 1">
-            <a:extLst>
-              <a:ext uri="{FF2B5EF4-FFF2-40B4-BE49-F238E27FC236}">
-                <a16:creationId xmlns:a16="http://schemas.microsoft.com/office/drawing/2014/main" id="{209B4A58-19B9-2346-A1F8-D57355C7BC8B}"/>
-              </a:ext>
-            </a:extLst>
-          </p:cNvPr>
-          <p:cNvSpPr>
-            <a:spLocks noGrp="1"/>
-          </p:cNvSpPr>
-          <p:nvPr>
-            <p:ph type="title"/>
-          </p:nvPr>
-        </p:nvSpPr>
-        <p:spPr/>
-        <p:txBody>
-          <a:bodyPr/>
-          <a:lstStyle/>
-          <a:p>
-            <a:r>
-              <a:rPr lang="en-US" dirty="0"/>
-              <a:t>Add and commit a file</a:t>
-            </a:r>
-          </a:p>
-        </p:txBody>
-      </p:sp>
-      <p:pic>
-        <p:nvPicPr>
-          <p:cNvPr id="14" name="Content Placeholder 13">
-            <a:extLst>
-              <a:ext uri="{FF2B5EF4-FFF2-40B4-BE49-F238E27FC236}">
-                <a16:creationId xmlns:a16="http://schemas.microsoft.com/office/drawing/2014/main" id="{B2870603-EB16-584D-BA42-824530550F27}"/>
-              </a:ext>
-            </a:extLst>
-          </p:cNvPr>
-          <p:cNvPicPr>
-            <a:picLocks noGrp="1" noChangeAspect="1"/>
-          </p:cNvPicPr>
-          <p:nvPr>
-            <p:ph idx="1"/>
-          </p:nvPr>
-        </p:nvPicPr>
-        <p:blipFill>
-          <a:blip r:embed="rId2"/>
-          <a:stretch>
-            <a:fillRect/>
-          </a:stretch>
-        </p:blipFill>
-        <p:spPr>
-          <a:xfrm>
-            <a:off x="1529576" y="1490028"/>
-            <a:ext cx="10515600" cy="1917939"/>
-          </a:xfrm>
-        </p:spPr>
-      </p:pic>
-      <p:pic>
-        <p:nvPicPr>
-          <p:cNvPr id="16" name="Picture 15">
-            <a:extLst>
-              <a:ext uri="{FF2B5EF4-FFF2-40B4-BE49-F238E27FC236}">
-                <a16:creationId xmlns:a16="http://schemas.microsoft.com/office/drawing/2014/main" id="{F6ACFE08-62B6-BC44-8B19-68EB0EB3C629}"/>
-              </a:ext>
-            </a:extLst>
-          </p:cNvPr>
-          <p:cNvPicPr>
-            <a:picLocks noChangeAspect="1"/>
-          </p:cNvPicPr>
-          <p:nvPr/>
-        </p:nvPicPr>
-        <p:blipFill>
-          <a:blip r:embed="rId3"/>
-          <a:stretch>
-            <a:fillRect/>
-          </a:stretch>
-        </p:blipFill>
-        <p:spPr>
-          <a:xfrm>
-            <a:off x="3173219" y="3422497"/>
-            <a:ext cx="5845562" cy="2869640"/>
-          </a:xfrm>
-          <a:prstGeom prst="rect">
-            <a:avLst/>
-          </a:prstGeom>
-        </p:spPr>
-      </p:pic>
-      <p:sp>
-        <p:nvSpPr>
-          <p:cNvPr id="17" name="Down Arrow 16">
-            <a:extLst>
-              <a:ext uri="{FF2B5EF4-FFF2-40B4-BE49-F238E27FC236}">
-                <a16:creationId xmlns:a16="http://schemas.microsoft.com/office/drawing/2014/main" id="{AA045555-4829-B446-B762-8B8778FFF9E1}"/>
-              </a:ext>
-            </a:extLst>
-          </p:cNvPr>
-          <p:cNvSpPr/>
-          <p:nvPr/>
-        </p:nvSpPr>
-        <p:spPr>
-          <a:xfrm rot="16200000" flipH="1">
-            <a:off x="693234" y="2472463"/>
-            <a:ext cx="289931" cy="992459"/>
-          </a:xfrm>
-          <a:prstGeom prst="downArrow">
-            <a:avLst/>
-          </a:prstGeom>
-          <a:solidFill>
-            <a:srgbClr val="C00000"/>
-          </a:solidFill>
-          <a:ln>
-            <a:solidFill>
-              <a:srgbClr val="C00000"/>
-            </a:solidFill>
-          </a:ln>
-        </p:spPr>
-        <p:style>
-          <a:lnRef idx="2">
-            <a:schemeClr val="accent1">
-              <a:shade val="50000"/>
-            </a:schemeClr>
-          </a:lnRef>
-          <a:fillRef idx="1">
-            <a:schemeClr val="accent1"/>
-          </a:fillRef>
-          <a:effectRef idx="0">
-            <a:schemeClr val="accent1"/>
-          </a:effectRef>
-          <a:fontRef idx="minor">
-            <a:schemeClr val="lt1"/>
-          </a:fontRef>
-        </p:style>
-        <p:txBody>
-          <a:bodyPr rtlCol="0" anchor="ctr"/>
-          <a:lstStyle/>
-          <a:p>
-            <a:pPr algn="ctr"/>
-            <a:endParaRPr lang="en-US"/>
-          </a:p>
-        </p:txBody>
-      </p:sp>
-      <p:sp>
-        <p:nvSpPr>
-          <p:cNvPr id="18" name="TextBox 17">
-            <a:extLst>
-              <a:ext uri="{FF2B5EF4-FFF2-40B4-BE49-F238E27FC236}">
-                <a16:creationId xmlns:a16="http://schemas.microsoft.com/office/drawing/2014/main" id="{B0702E7A-493A-AF4A-ABB6-12CE6A501214}"/>
-              </a:ext>
-            </a:extLst>
-          </p:cNvPr>
-          <p:cNvSpPr txBox="1"/>
-          <p:nvPr/>
-        </p:nvSpPr>
-        <p:spPr>
-          <a:xfrm>
-            <a:off x="0" y="2125831"/>
-            <a:ext cx="1380894" cy="646331"/>
-          </a:xfrm>
-          <a:prstGeom prst="rect">
-            <a:avLst/>
-          </a:prstGeom>
-          <a:noFill/>
-        </p:spPr>
-        <p:txBody>
-          <a:bodyPr wrap="square" rtlCol="0">
-            <a:spAutoFit/>
-          </a:bodyPr>
-          <a:lstStyle/>
-          <a:p>
-            <a:pPr algn="r"/>
-            <a:r>
-              <a:rPr lang="en-US" dirty="0"/>
-              <a:t>Select file(s) to add</a:t>
-            </a:r>
-          </a:p>
-        </p:txBody>
-      </p:sp>
-      <p:sp>
-        <p:nvSpPr>
-          <p:cNvPr id="19" name="Down Arrow 18">
-            <a:extLst>
-              <a:ext uri="{FF2B5EF4-FFF2-40B4-BE49-F238E27FC236}">
-                <a16:creationId xmlns:a16="http://schemas.microsoft.com/office/drawing/2014/main" id="{1B5C0ED9-7228-AC4D-9E1F-6766BAF41509}"/>
-              </a:ext>
-            </a:extLst>
-          </p:cNvPr>
-          <p:cNvSpPr/>
-          <p:nvPr/>
-        </p:nvSpPr>
-        <p:spPr>
-          <a:xfrm rot="16200000" flipH="1">
-            <a:off x="2509723" y="3313819"/>
-            <a:ext cx="289931" cy="992459"/>
-          </a:xfrm>
-          <a:prstGeom prst="downArrow">
-            <a:avLst/>
-          </a:prstGeom>
-          <a:solidFill>
-            <a:srgbClr val="C00000"/>
-          </a:solidFill>
-          <a:ln>
-            <a:solidFill>
-              <a:srgbClr val="C00000"/>
-            </a:solidFill>
-          </a:ln>
-        </p:spPr>
-        <p:style>
-          <a:lnRef idx="2">
-            <a:schemeClr val="accent1">
-              <a:shade val="50000"/>
-            </a:schemeClr>
-          </a:lnRef>
-          <a:fillRef idx="1">
-            <a:schemeClr val="accent1"/>
-          </a:fillRef>
-          <a:effectRef idx="0">
-            <a:schemeClr val="accent1"/>
-          </a:effectRef>
-          <a:fontRef idx="minor">
-            <a:schemeClr val="lt1"/>
-          </a:fontRef>
-        </p:style>
-        <p:txBody>
-          <a:bodyPr rtlCol="0" anchor="ctr"/>
-          <a:lstStyle/>
-          <a:p>
-            <a:pPr algn="ctr"/>
-            <a:endParaRPr lang="en-US"/>
-          </a:p>
-        </p:txBody>
-      </p:sp>
-      <p:sp>
-        <p:nvSpPr>
-          <p:cNvPr id="20" name="TextBox 19">
-            <a:extLst>
-              <a:ext uri="{FF2B5EF4-FFF2-40B4-BE49-F238E27FC236}">
-                <a16:creationId xmlns:a16="http://schemas.microsoft.com/office/drawing/2014/main" id="{F06A19E9-DFC7-364B-8DB3-FBA7CC51A5F8}"/>
-              </a:ext>
-            </a:extLst>
-          </p:cNvPr>
-          <p:cNvSpPr txBox="1"/>
-          <p:nvPr/>
-        </p:nvSpPr>
-        <p:spPr>
-          <a:xfrm>
-            <a:off x="281336" y="3519944"/>
-            <a:ext cx="1877123" cy="646331"/>
-          </a:xfrm>
-          <a:prstGeom prst="rect">
-            <a:avLst/>
-          </a:prstGeom>
-          <a:noFill/>
-        </p:spPr>
-        <p:txBody>
-          <a:bodyPr wrap="square" rtlCol="0">
-            <a:spAutoFit/>
-          </a:bodyPr>
-          <a:lstStyle/>
-          <a:p>
-            <a:pPr algn="r"/>
-            <a:r>
-              <a:rPr lang="en-US" dirty="0"/>
-              <a:t>Must have a main commit message</a:t>
-            </a:r>
-          </a:p>
-        </p:txBody>
-      </p:sp>
-      <p:sp>
-        <p:nvSpPr>
-          <p:cNvPr id="21" name="Down Arrow 20">
-            <a:extLst>
-              <a:ext uri="{FF2B5EF4-FFF2-40B4-BE49-F238E27FC236}">
-                <a16:creationId xmlns:a16="http://schemas.microsoft.com/office/drawing/2014/main" id="{96166AE6-39DB-974B-9660-8F437967B4FD}"/>
-              </a:ext>
-            </a:extLst>
-          </p:cNvPr>
-          <p:cNvSpPr/>
-          <p:nvPr/>
-        </p:nvSpPr>
-        <p:spPr>
-          <a:xfrm rot="16200000" flipH="1">
-            <a:off x="2509723" y="4208251"/>
-            <a:ext cx="289931" cy="992459"/>
-          </a:xfrm>
-          <a:prstGeom prst="downArrow">
-            <a:avLst/>
-          </a:prstGeom>
-          <a:solidFill>
-            <a:srgbClr val="C00000"/>
-          </a:solidFill>
-          <a:ln>
-            <a:solidFill>
-              <a:srgbClr val="C00000"/>
-            </a:solidFill>
-          </a:ln>
-        </p:spPr>
-        <p:style>
-          <a:lnRef idx="2">
-            <a:schemeClr val="accent1">
-              <a:shade val="50000"/>
-            </a:schemeClr>
-          </a:lnRef>
-          <a:fillRef idx="1">
-            <a:schemeClr val="accent1"/>
-          </a:fillRef>
-          <a:effectRef idx="0">
-            <a:schemeClr val="accent1"/>
-          </a:effectRef>
-          <a:fontRef idx="minor">
-            <a:schemeClr val="lt1"/>
-          </a:fontRef>
-        </p:style>
-        <p:txBody>
-          <a:bodyPr rtlCol="0" anchor="ctr"/>
-          <a:lstStyle/>
-          <a:p>
-            <a:pPr algn="ctr"/>
-            <a:endParaRPr lang="en-US"/>
-          </a:p>
-        </p:txBody>
-      </p:sp>
-      <p:sp>
-        <p:nvSpPr>
-          <p:cNvPr id="22" name="TextBox 21">
-            <a:extLst>
-              <a:ext uri="{FF2B5EF4-FFF2-40B4-BE49-F238E27FC236}">
-                <a16:creationId xmlns:a16="http://schemas.microsoft.com/office/drawing/2014/main" id="{726FB58D-2DCC-0348-9489-454AB6C1B813}"/>
-              </a:ext>
-            </a:extLst>
-          </p:cNvPr>
-          <p:cNvSpPr txBox="1"/>
-          <p:nvPr/>
-        </p:nvSpPr>
-        <p:spPr>
-          <a:xfrm>
-            <a:off x="281336" y="4414376"/>
-            <a:ext cx="1877123" cy="646331"/>
-          </a:xfrm>
-          <a:prstGeom prst="rect">
-            <a:avLst/>
-          </a:prstGeom>
-          <a:noFill/>
-        </p:spPr>
-        <p:txBody>
-          <a:bodyPr wrap="square" rtlCol="0">
-            <a:spAutoFit/>
-          </a:bodyPr>
-          <a:lstStyle/>
-          <a:p>
-            <a:pPr algn="r"/>
-            <a:r>
-              <a:rPr lang="en-US" dirty="0"/>
-              <a:t>Optional additional details</a:t>
-            </a:r>
-          </a:p>
-        </p:txBody>
-      </p:sp>
-      <p:sp>
-        <p:nvSpPr>
-          <p:cNvPr id="23" name="Down Arrow 22">
-            <a:extLst>
-              <a:ext uri="{FF2B5EF4-FFF2-40B4-BE49-F238E27FC236}">
-                <a16:creationId xmlns:a16="http://schemas.microsoft.com/office/drawing/2014/main" id="{6D049E9E-F4D2-B346-8852-6AEED78658DB}"/>
-              </a:ext>
-            </a:extLst>
-          </p:cNvPr>
-          <p:cNvSpPr/>
-          <p:nvPr/>
-        </p:nvSpPr>
-        <p:spPr>
-          <a:xfrm>
-            <a:off x="9188606" y="1323017"/>
-            <a:ext cx="289931" cy="992459"/>
-          </a:xfrm>
-          <a:prstGeom prst="downArrow">
-            <a:avLst/>
-          </a:prstGeom>
-          <a:solidFill>
-            <a:srgbClr val="C00000"/>
-          </a:solidFill>
-          <a:ln>
-            <a:solidFill>
-              <a:srgbClr val="C00000"/>
-            </a:solidFill>
-          </a:ln>
-        </p:spPr>
-        <p:style>
-          <a:lnRef idx="2">
-            <a:schemeClr val="accent1">
-              <a:shade val="50000"/>
-            </a:schemeClr>
-          </a:lnRef>
-          <a:fillRef idx="1">
-            <a:schemeClr val="accent1"/>
-          </a:fillRef>
-          <a:effectRef idx="0">
-            <a:schemeClr val="accent1"/>
-          </a:effectRef>
-          <a:fontRef idx="minor">
-            <a:schemeClr val="lt1"/>
-          </a:fontRef>
-        </p:style>
-        <p:txBody>
-          <a:bodyPr rtlCol="0" anchor="ctr"/>
-          <a:lstStyle/>
-          <a:p>
-            <a:pPr algn="ctr"/>
-            <a:endParaRPr lang="en-US"/>
-          </a:p>
-        </p:txBody>
-      </p:sp>
-      <p:sp>
-        <p:nvSpPr>
-          <p:cNvPr id="24" name="TextBox 23">
-            <a:extLst>
-              <a:ext uri="{FF2B5EF4-FFF2-40B4-BE49-F238E27FC236}">
-                <a16:creationId xmlns:a16="http://schemas.microsoft.com/office/drawing/2014/main" id="{69932361-6E18-644F-AD86-6200381CC948}"/>
-              </a:ext>
-            </a:extLst>
-          </p:cNvPr>
-          <p:cNvSpPr txBox="1"/>
-          <p:nvPr/>
-        </p:nvSpPr>
-        <p:spPr>
-          <a:xfrm>
-            <a:off x="7559946" y="604411"/>
-            <a:ext cx="3547250" cy="646331"/>
-          </a:xfrm>
-          <a:prstGeom prst="rect">
-            <a:avLst/>
-          </a:prstGeom>
-          <a:noFill/>
-        </p:spPr>
-        <p:txBody>
-          <a:bodyPr wrap="square" rtlCol="0">
-            <a:spAutoFit/>
-          </a:bodyPr>
-          <a:lstStyle/>
-          <a:p>
-            <a:pPr algn="ctr"/>
-            <a:r>
-              <a:rPr lang="en-US" dirty="0"/>
-              <a:t>If it is a text-based file, see line specific changes since last commit</a:t>
-            </a:r>
-          </a:p>
-        </p:txBody>
-      </p:sp>
-      <p:sp>
-        <p:nvSpPr>
-          <p:cNvPr id="25" name="Down Arrow 24">
-            <a:extLst>
-              <a:ext uri="{FF2B5EF4-FFF2-40B4-BE49-F238E27FC236}">
-                <a16:creationId xmlns:a16="http://schemas.microsoft.com/office/drawing/2014/main" id="{99AA1361-4851-4A4C-BDDD-56DF4ECDC2D5}"/>
-              </a:ext>
-            </a:extLst>
-          </p:cNvPr>
-          <p:cNvSpPr/>
-          <p:nvPr/>
-        </p:nvSpPr>
-        <p:spPr>
-          <a:xfrm rot="16200000" flipH="1">
-            <a:off x="2509724" y="5471800"/>
-            <a:ext cx="289931" cy="992459"/>
-          </a:xfrm>
-          <a:prstGeom prst="downArrow">
-            <a:avLst/>
-          </a:prstGeom>
-          <a:solidFill>
-            <a:srgbClr val="C00000"/>
-          </a:solidFill>
-          <a:ln>
-            <a:solidFill>
-              <a:srgbClr val="C00000"/>
-            </a:solidFill>
-          </a:ln>
-        </p:spPr>
-        <p:style>
-          <a:lnRef idx="2">
-            <a:schemeClr val="accent1">
-              <a:shade val="50000"/>
-            </a:schemeClr>
-          </a:lnRef>
-          <a:fillRef idx="1">
-            <a:schemeClr val="accent1"/>
-          </a:fillRef>
-          <a:effectRef idx="0">
-            <a:schemeClr val="accent1"/>
-          </a:effectRef>
-          <a:fontRef idx="minor">
-            <a:schemeClr val="lt1"/>
-          </a:fontRef>
-        </p:style>
-        <p:txBody>
-          <a:bodyPr rtlCol="0" anchor="ctr"/>
-          <a:lstStyle/>
-          <a:p>
-            <a:pPr algn="ctr"/>
-            <a:endParaRPr lang="en-US"/>
-          </a:p>
-        </p:txBody>
-      </p:sp>
-      <p:sp>
-        <p:nvSpPr>
-          <p:cNvPr id="26" name="TextBox 25">
-            <a:extLst>
-              <a:ext uri="{FF2B5EF4-FFF2-40B4-BE49-F238E27FC236}">
-                <a16:creationId xmlns:a16="http://schemas.microsoft.com/office/drawing/2014/main" id="{778B3A43-807A-E742-8509-B54A72D5373C}"/>
-              </a:ext>
-            </a:extLst>
-          </p:cNvPr>
-          <p:cNvSpPr txBox="1"/>
-          <p:nvPr/>
-        </p:nvSpPr>
-        <p:spPr>
-          <a:xfrm>
-            <a:off x="281337" y="5677925"/>
-            <a:ext cx="1877123" cy="646331"/>
-          </a:xfrm>
-          <a:prstGeom prst="rect">
-            <a:avLst/>
-          </a:prstGeom>
-          <a:noFill/>
-        </p:spPr>
-        <p:txBody>
-          <a:bodyPr wrap="square" rtlCol="0">
-            <a:spAutoFit/>
-          </a:bodyPr>
-          <a:lstStyle/>
-          <a:p>
-            <a:pPr algn="r"/>
-            <a:r>
-              <a:rPr lang="en-US" dirty="0"/>
-              <a:t>Most recent commit message</a:t>
-            </a:r>
-          </a:p>
-        </p:txBody>
-      </p:sp>
-    </p:spTree>
-    <p:extLst>
-      <p:ext uri="{BB962C8B-B14F-4D97-AF65-F5344CB8AC3E}">
-        <p14:creationId xmlns:p14="http://schemas.microsoft.com/office/powerpoint/2010/main" val="2138549737"/>
-      </p:ext>
-    </p:extLst>
-  </p:cSld>
-  <p:clrMapOvr>
-    <a:masterClrMapping/>
-  </p:clrMapOvr>
-</p:sld>
-</file>
-
 <file path=ppt/slides/slide7.xml><?xml version="1.0" encoding="utf-8"?>
 <p:sld xmlns:a="http://schemas.openxmlformats.org/drawingml/2006/main" xmlns:r="http://schemas.openxmlformats.org/officeDocument/2006/relationships" xmlns:p="http://schemas.openxmlformats.org/presentationml/2006/main">
   <p:cSld>
@@ -7803,17 +6581,17 @@
           <a:p>
             <a:r>
               <a:rPr lang="en-US" dirty="0"/>
-              <a:t>Ignore a file</a:t>
+              <a:t>Create a new repository</a:t>
             </a:r>
           </a:p>
         </p:txBody>
       </p:sp>
       <p:pic>
         <p:nvPicPr>
-          <p:cNvPr id="9" name="Content Placeholder 8">
-            <a:extLst>
-              <a:ext uri="{FF2B5EF4-FFF2-40B4-BE49-F238E27FC236}">
-                <a16:creationId xmlns:a16="http://schemas.microsoft.com/office/drawing/2014/main" id="{3E50C29C-8026-024F-BF00-58DBBFA906D8}"/>
+          <p:cNvPr id="10" name="Content Placeholder 9">
+            <a:extLst>
+              <a:ext uri="{FF2B5EF4-FFF2-40B4-BE49-F238E27FC236}">
+                <a16:creationId xmlns:a16="http://schemas.microsoft.com/office/drawing/2014/main" id="{BE9C3043-D92B-C540-A935-2FCA7C028436}"/>
               </a:ext>
             </a:extLst>
           </p:cNvPr>
@@ -7824,25 +6602,24 @@
             <p:ph idx="1"/>
           </p:nvPr>
         </p:nvPicPr>
-        <p:blipFill>
+        <p:blipFill rotWithShape="1">
           <a:blip r:embed="rId2"/>
-          <a:stretch>
-            <a:fillRect/>
-          </a:stretch>
+          <a:srcRect r="15896"/>
+          <a:stretch/>
         </p:blipFill>
         <p:spPr>
           <a:xfrm>
-            <a:off x="3591467" y="1278537"/>
-            <a:ext cx="5009066" cy="2753988"/>
+            <a:off x="302941" y="1611217"/>
+            <a:ext cx="5618356" cy="1524000"/>
           </a:xfrm>
         </p:spPr>
       </p:pic>
       <p:pic>
         <p:nvPicPr>
-          <p:cNvPr id="11" name="Picture 10">
-            <a:extLst>
-              <a:ext uri="{FF2B5EF4-FFF2-40B4-BE49-F238E27FC236}">
-                <a16:creationId xmlns:a16="http://schemas.microsoft.com/office/drawing/2014/main" id="{1368F551-2FD9-2E4D-8433-8212F1CE6BC4}"/>
+          <p:cNvPr id="12" name="Picture 11">
+            <a:extLst>
+              <a:ext uri="{FF2B5EF4-FFF2-40B4-BE49-F238E27FC236}">
+                <a16:creationId xmlns:a16="http://schemas.microsoft.com/office/drawing/2014/main" id="{860F1E60-DBA3-7448-965B-949C1425492A}"/>
               </a:ext>
             </a:extLst>
           </p:cNvPr>
@@ -7859,8 +6636,8 @@
         </p:blipFill>
         <p:spPr>
           <a:xfrm>
-            <a:off x="203200" y="4050268"/>
-            <a:ext cx="11785600" cy="2438400"/>
+            <a:off x="6576277" y="737218"/>
+            <a:ext cx="5016500" cy="5740400"/>
           </a:xfrm>
           <a:prstGeom prst="rect">
             <a:avLst/>
@@ -7869,10 +6646,10 @@
       </p:pic>
       <p:sp>
         <p:nvSpPr>
-          <p:cNvPr id="12" name="Down Arrow 11">
-            <a:extLst>
-              <a:ext uri="{FF2B5EF4-FFF2-40B4-BE49-F238E27FC236}">
-                <a16:creationId xmlns:a16="http://schemas.microsoft.com/office/drawing/2014/main" id="{6F94056E-64D5-3641-9B76-634887ABE097}"/>
+          <p:cNvPr id="13" name="Down Arrow 12">
+            <a:extLst>
+              <a:ext uri="{FF2B5EF4-FFF2-40B4-BE49-F238E27FC236}">
+                <a16:creationId xmlns:a16="http://schemas.microsoft.com/office/drawing/2014/main" id="{50C50D1B-9271-3C4F-8D55-0308D909156E}"/>
               </a:ext>
             </a:extLst>
           </p:cNvPr>
@@ -7880,8 +6657,8 @@
           <p:nvPr/>
         </p:nvSpPr>
         <p:spPr>
-          <a:xfrm rot="5400000">
-            <a:off x="8951797" y="2005207"/>
+          <a:xfrm rot="16200000" flipH="1">
+            <a:off x="6114972" y="3403257"/>
             <a:ext cx="289931" cy="992459"/>
           </a:xfrm>
           <a:prstGeom prst="downArrow">
@@ -7917,16 +6694,16 @@
           <a:lstStyle/>
           <a:p>
             <a:pPr algn="ctr"/>
-            <a:endParaRPr lang="en-US"/>
-          </a:p>
-        </p:txBody>
-      </p:sp>
-      <p:sp>
-        <p:nvSpPr>
-          <p:cNvPr id="13" name="TextBox 12">
-            <a:extLst>
-              <a:ext uri="{FF2B5EF4-FFF2-40B4-BE49-F238E27FC236}">
-                <a16:creationId xmlns:a16="http://schemas.microsoft.com/office/drawing/2014/main" id="{6CB90170-46C6-D244-8B68-1E37E320093D}"/>
+            <a:endParaRPr lang="en-US" dirty="0"/>
+          </a:p>
+        </p:txBody>
+      </p:sp>
+      <p:sp>
+        <p:nvSpPr>
+          <p:cNvPr id="14" name="TextBox 13">
+            <a:extLst>
+              <a:ext uri="{FF2B5EF4-FFF2-40B4-BE49-F238E27FC236}">
+                <a16:creationId xmlns:a16="http://schemas.microsoft.com/office/drawing/2014/main" id="{6A91A383-386A-3349-9986-6C17933CFC9B}"/>
               </a:ext>
             </a:extLst>
           </p:cNvPr>
@@ -7935,8 +6712,8 @@
         </p:nvSpPr>
         <p:spPr>
           <a:xfrm>
-            <a:off x="9592992" y="2322911"/>
-            <a:ext cx="1137234" cy="369332"/>
+            <a:off x="3379903" y="3714820"/>
+            <a:ext cx="2383805" cy="369332"/>
           </a:xfrm>
           <a:prstGeom prst="rect">
             <a:avLst/>
@@ -7944,14 +6721,195 @@
           <a:noFill/>
         </p:spPr>
         <p:txBody>
-          <a:bodyPr wrap="none" rtlCol="0">
+          <a:bodyPr wrap="square" rtlCol="0">
             <a:spAutoFit/>
           </a:bodyPr>
           <a:lstStyle/>
           <a:p>
+            <a:pPr algn="r"/>
             <a:r>
               <a:rPr lang="en-US" dirty="0"/>
-              <a:t>Right-click</a:t>
+              <a:t>Always have a README</a:t>
+            </a:r>
+          </a:p>
+        </p:txBody>
+      </p:sp>
+      <p:sp>
+        <p:nvSpPr>
+          <p:cNvPr id="15" name="Down Arrow 14">
+            <a:extLst>
+              <a:ext uri="{FF2B5EF4-FFF2-40B4-BE49-F238E27FC236}">
+                <a16:creationId xmlns:a16="http://schemas.microsoft.com/office/drawing/2014/main" id="{71AB9BAE-5210-0F48-805C-94CA4E6BAE4A}"/>
+              </a:ext>
+            </a:extLst>
+          </p:cNvPr>
+          <p:cNvSpPr/>
+          <p:nvPr/>
+        </p:nvSpPr>
+        <p:spPr>
+          <a:xfrm rot="16200000" flipH="1">
+            <a:off x="6103821" y="4015622"/>
+            <a:ext cx="289931" cy="992459"/>
+          </a:xfrm>
+          <a:prstGeom prst="downArrow">
+            <a:avLst/>
+          </a:prstGeom>
+          <a:solidFill>
+            <a:srgbClr val="C00000"/>
+          </a:solidFill>
+          <a:ln>
+            <a:solidFill>
+              <a:srgbClr val="C00000"/>
+            </a:solidFill>
+          </a:ln>
+        </p:spPr>
+        <p:style>
+          <a:lnRef idx="2">
+            <a:schemeClr val="accent1">
+              <a:shade val="50000"/>
+            </a:schemeClr>
+          </a:lnRef>
+          <a:fillRef idx="1">
+            <a:schemeClr val="accent1"/>
+          </a:fillRef>
+          <a:effectRef idx="0">
+            <a:schemeClr val="accent1"/>
+          </a:effectRef>
+          <a:fontRef idx="minor">
+            <a:schemeClr val="lt1"/>
+          </a:fontRef>
+        </p:style>
+        <p:txBody>
+          <a:bodyPr rtlCol="0" anchor="ctr"/>
+          <a:lstStyle/>
+          <a:p>
+            <a:pPr algn="ctr"/>
+            <a:endParaRPr lang="en-US"/>
+          </a:p>
+        </p:txBody>
+      </p:sp>
+      <p:sp>
+        <p:nvSpPr>
+          <p:cNvPr id="16" name="TextBox 15">
+            <a:extLst>
+              <a:ext uri="{FF2B5EF4-FFF2-40B4-BE49-F238E27FC236}">
+                <a16:creationId xmlns:a16="http://schemas.microsoft.com/office/drawing/2014/main" id="{EB6A63F2-863D-BA4B-9338-22314ED30C2B}"/>
+              </a:ext>
+            </a:extLst>
+          </p:cNvPr>
+          <p:cNvSpPr txBox="1"/>
+          <p:nvPr/>
+        </p:nvSpPr>
+        <p:spPr>
+          <a:xfrm>
+            <a:off x="2096429" y="4226600"/>
+            <a:ext cx="3656128" cy="646331"/>
+          </a:xfrm>
+          <a:prstGeom prst="rect">
+            <a:avLst/>
+          </a:prstGeom>
+          <a:noFill/>
+        </p:spPr>
+        <p:txBody>
+          <a:bodyPr wrap="square" rtlCol="0">
+            <a:spAutoFit/>
+          </a:bodyPr>
+          <a:lstStyle/>
+          <a:p>
+            <a:pPr algn="r"/>
+            <a:r>
+              <a:rPr lang="en-US" dirty="0"/>
+              <a:t>Optionally auto generate common ignored files for different programs</a:t>
+            </a:r>
+          </a:p>
+        </p:txBody>
+      </p:sp>
+      <p:sp>
+        <p:nvSpPr>
+          <p:cNvPr id="17" name="Down Arrow 16">
+            <a:extLst>
+              <a:ext uri="{FF2B5EF4-FFF2-40B4-BE49-F238E27FC236}">
+                <a16:creationId xmlns:a16="http://schemas.microsoft.com/office/drawing/2014/main" id="{4248D804-8751-CD4C-AC7A-81184F6DF6EF}"/>
+              </a:ext>
+            </a:extLst>
+          </p:cNvPr>
+          <p:cNvSpPr/>
+          <p:nvPr/>
+        </p:nvSpPr>
+        <p:spPr>
+          <a:xfrm rot="16200000" flipH="1">
+            <a:off x="6103821" y="4794221"/>
+            <a:ext cx="289931" cy="992459"/>
+          </a:xfrm>
+          <a:prstGeom prst="downArrow">
+            <a:avLst/>
+          </a:prstGeom>
+          <a:solidFill>
+            <a:srgbClr val="C00000"/>
+          </a:solidFill>
+          <a:ln>
+            <a:solidFill>
+              <a:srgbClr val="C00000"/>
+            </a:solidFill>
+          </a:ln>
+        </p:spPr>
+        <p:style>
+          <a:lnRef idx="2">
+            <a:schemeClr val="accent1">
+              <a:shade val="50000"/>
+            </a:schemeClr>
+          </a:lnRef>
+          <a:fillRef idx="1">
+            <a:schemeClr val="accent1"/>
+          </a:fillRef>
+          <a:effectRef idx="0">
+            <a:schemeClr val="accent1"/>
+          </a:effectRef>
+          <a:fontRef idx="minor">
+            <a:schemeClr val="lt1"/>
+          </a:fontRef>
+        </p:style>
+        <p:txBody>
+          <a:bodyPr rtlCol="0" anchor="ctr"/>
+          <a:lstStyle/>
+          <a:p>
+            <a:pPr algn="ctr"/>
+            <a:endParaRPr lang="en-US"/>
+          </a:p>
+        </p:txBody>
+      </p:sp>
+      <p:sp>
+        <p:nvSpPr>
+          <p:cNvPr id="18" name="TextBox 17">
+            <a:extLst>
+              <a:ext uri="{FF2B5EF4-FFF2-40B4-BE49-F238E27FC236}">
+                <a16:creationId xmlns:a16="http://schemas.microsoft.com/office/drawing/2014/main" id="{7D97E75E-9FFB-0F47-9497-ED9A329C5976}"/>
+              </a:ext>
+            </a:extLst>
+          </p:cNvPr>
+          <p:cNvSpPr txBox="1"/>
+          <p:nvPr/>
+        </p:nvSpPr>
+        <p:spPr>
+          <a:xfrm>
+            <a:off x="2877015" y="5002582"/>
+            <a:ext cx="2875542" cy="646331"/>
+          </a:xfrm>
+          <a:prstGeom prst="rect">
+            <a:avLst/>
+          </a:prstGeom>
+          <a:noFill/>
+        </p:spPr>
+        <p:txBody>
+          <a:bodyPr wrap="square" rtlCol="0">
+            <a:spAutoFit/>
+          </a:bodyPr>
+          <a:lstStyle/>
+          <a:p>
+            <a:pPr algn="r"/>
+            <a:r>
+              <a:rPr lang="en-US" dirty="0"/>
+              <a:t>Add license so others can use your code if made public</a:t>
             </a:r>
           </a:p>
         </p:txBody>
@@ -7959,7 +6917,7 @@
     </p:spTree>
     <p:extLst>
       <p:ext uri="{BB962C8B-B14F-4D97-AF65-F5344CB8AC3E}">
-        <p14:creationId xmlns:p14="http://schemas.microsoft.com/office/powerpoint/2010/main" val="4130995991"/>
+        <p14:creationId xmlns:p14="http://schemas.microsoft.com/office/powerpoint/2010/main" val="2368947156"/>
       </p:ext>
     </p:extLst>
   </p:cSld>
@@ -8009,17 +6967,17 @@
           <a:p>
             <a:r>
               <a:rPr lang="en-US" dirty="0"/>
-              <a:t>View complete history</a:t>
+              <a:t>Add and commit a file</a:t>
             </a:r>
           </a:p>
         </p:txBody>
       </p:sp>
       <p:pic>
         <p:nvPicPr>
-          <p:cNvPr id="6" name="Content Placeholder 5">
-            <a:extLst>
-              <a:ext uri="{FF2B5EF4-FFF2-40B4-BE49-F238E27FC236}">
-                <a16:creationId xmlns:a16="http://schemas.microsoft.com/office/drawing/2014/main" id="{062676E6-2972-FE44-B7FF-311A8007F4AB}"/>
+          <p:cNvPr id="14" name="Content Placeholder 13">
+            <a:extLst>
+              <a:ext uri="{FF2B5EF4-FFF2-40B4-BE49-F238E27FC236}">
+                <a16:creationId xmlns:a16="http://schemas.microsoft.com/office/drawing/2014/main" id="{B2870603-EB16-584D-BA42-824530550F27}"/>
               </a:ext>
             </a:extLst>
           </p:cNvPr>
@@ -8038,75 +6996,47 @@
         </p:blipFill>
         <p:spPr>
           <a:xfrm>
-            <a:off x="838200" y="2217665"/>
-            <a:ext cx="10515600" cy="2422669"/>
+            <a:off x="1529576" y="1490028"/>
+            <a:ext cx="10515600" cy="1917939"/>
           </a:xfrm>
         </p:spPr>
       </p:pic>
-      <p:sp>
-        <p:nvSpPr>
-          <p:cNvPr id="4" name="TextBox 3">
-            <a:extLst>
-              <a:ext uri="{FF2B5EF4-FFF2-40B4-BE49-F238E27FC236}">
-                <a16:creationId xmlns:a16="http://schemas.microsoft.com/office/drawing/2014/main" id="{0F68332A-508A-E847-B82F-E7062B8FF7C9}"/>
-              </a:ext>
-            </a:extLst>
-          </p:cNvPr>
-          <p:cNvSpPr txBox="1"/>
+      <p:pic>
+        <p:nvPicPr>
+          <p:cNvPr id="16" name="Picture 15">
+            <a:extLst>
+              <a:ext uri="{FF2B5EF4-FFF2-40B4-BE49-F238E27FC236}">
+                <a16:creationId xmlns:a16="http://schemas.microsoft.com/office/drawing/2014/main" id="{F6ACFE08-62B6-BC44-8B19-68EB0EB3C629}"/>
+              </a:ext>
+            </a:extLst>
+          </p:cNvPr>
+          <p:cNvPicPr>
+            <a:picLocks noChangeAspect="1"/>
+          </p:cNvPicPr>
           <p:nvPr/>
-        </p:nvSpPr>
-        <p:spPr>
-          <a:xfrm>
-            <a:off x="0" y="6488668"/>
-            <a:ext cx="12192000" cy="369332"/>
+        </p:nvPicPr>
+        <p:blipFill>
+          <a:blip r:embed="rId3"/>
+          <a:stretch>
+            <a:fillRect/>
+          </a:stretch>
+        </p:blipFill>
+        <p:spPr>
+          <a:xfrm>
+            <a:off x="3173219" y="3422497"/>
+            <a:ext cx="5845562" cy="2869640"/>
           </a:xfrm>
           <a:prstGeom prst="rect">
             <a:avLst/>
           </a:prstGeom>
-          <a:noFill/>
-        </p:spPr>
-        <p:txBody>
-          <a:bodyPr wrap="square" rtlCol="0">
-            <a:spAutoFit/>
-          </a:bodyPr>
-          <a:lstStyle/>
-          <a:p>
-            <a:pPr algn="ctr"/>
-            <a:r>
-              <a:rPr lang="en-US" dirty="0" err="1"/>
-              <a:t>kadm@uw.edu</a:t>
-            </a:r>
-            <a:r>
-              <a:rPr lang="en-US" dirty="0"/>
-              <a:t>	@</a:t>
-            </a:r>
-            <a:r>
-              <a:rPr lang="en-US" dirty="0" err="1"/>
-              <a:t>kdillmcfarland</a:t>
-            </a:r>
-            <a:r>
-              <a:rPr lang="en-US" dirty="0"/>
-              <a:t>						Slides </a:t>
-            </a:r>
-            <a:r>
-              <a:rPr lang="en-US" dirty="0">
-                <a:hlinkClick r:id="rId3"/>
-              </a:rPr>
-              <a:t>https://tinyurl.com/4zsqs2rd</a:t>
-            </a:r>
-            <a:r>
-              <a:rPr lang="en-US" dirty="0"/>
-              <a:t> </a:t>
-            </a:r>
-          </a:p>
-        </p:txBody>
-      </p:sp>
-      <p:sp>
-        <p:nvSpPr>
-          <p:cNvPr id="7" name="Down Arrow 6">
-            <a:extLst>
-              <a:ext uri="{FF2B5EF4-FFF2-40B4-BE49-F238E27FC236}">
-                <a16:creationId xmlns:a16="http://schemas.microsoft.com/office/drawing/2014/main" id="{239A5821-830F-9647-8075-3E51BB77E3EA}"/>
+        </p:spPr>
+      </p:pic>
+      <p:sp>
+        <p:nvSpPr>
+          <p:cNvPr id="17" name="Down Arrow 16">
+            <a:extLst>
+              <a:ext uri="{FF2B5EF4-FFF2-40B4-BE49-F238E27FC236}">
+                <a16:creationId xmlns:a16="http://schemas.microsoft.com/office/drawing/2014/main" id="{AA045555-4829-B446-B762-8B8778FFF9E1}"/>
               </a:ext>
             </a:extLst>
           </p:cNvPr>
@@ -8114,8 +7044,8 @@
           <p:nvPr/>
         </p:nvSpPr>
         <p:spPr>
-          <a:xfrm>
-            <a:off x="3891776" y="1622395"/>
+          <a:xfrm rot="16200000" flipH="1">
+            <a:off x="693234" y="2472463"/>
             <a:ext cx="289931" cy="992459"/>
           </a:xfrm>
           <a:prstGeom prst="downArrow">
@@ -8155,10 +7085,406 @@
           </a:p>
         </p:txBody>
       </p:sp>
+      <p:sp>
+        <p:nvSpPr>
+          <p:cNvPr id="18" name="TextBox 17">
+            <a:extLst>
+              <a:ext uri="{FF2B5EF4-FFF2-40B4-BE49-F238E27FC236}">
+                <a16:creationId xmlns:a16="http://schemas.microsoft.com/office/drawing/2014/main" id="{B0702E7A-493A-AF4A-ABB6-12CE6A501214}"/>
+              </a:ext>
+            </a:extLst>
+          </p:cNvPr>
+          <p:cNvSpPr txBox="1"/>
+          <p:nvPr/>
+        </p:nvSpPr>
+        <p:spPr>
+          <a:xfrm>
+            <a:off x="0" y="2125831"/>
+            <a:ext cx="1380894" cy="646331"/>
+          </a:xfrm>
+          <a:prstGeom prst="rect">
+            <a:avLst/>
+          </a:prstGeom>
+          <a:noFill/>
+        </p:spPr>
+        <p:txBody>
+          <a:bodyPr wrap="square" rtlCol="0">
+            <a:spAutoFit/>
+          </a:bodyPr>
+          <a:lstStyle/>
+          <a:p>
+            <a:pPr algn="r"/>
+            <a:r>
+              <a:rPr lang="en-US" dirty="0"/>
+              <a:t>Select file(s) to add</a:t>
+            </a:r>
+          </a:p>
+        </p:txBody>
+      </p:sp>
+      <p:sp>
+        <p:nvSpPr>
+          <p:cNvPr id="19" name="Down Arrow 18">
+            <a:extLst>
+              <a:ext uri="{FF2B5EF4-FFF2-40B4-BE49-F238E27FC236}">
+                <a16:creationId xmlns:a16="http://schemas.microsoft.com/office/drawing/2014/main" id="{1B5C0ED9-7228-AC4D-9E1F-6766BAF41509}"/>
+              </a:ext>
+            </a:extLst>
+          </p:cNvPr>
+          <p:cNvSpPr/>
+          <p:nvPr/>
+        </p:nvSpPr>
+        <p:spPr>
+          <a:xfrm rot="16200000" flipH="1">
+            <a:off x="2509723" y="3313819"/>
+            <a:ext cx="289931" cy="992459"/>
+          </a:xfrm>
+          <a:prstGeom prst="downArrow">
+            <a:avLst/>
+          </a:prstGeom>
+          <a:solidFill>
+            <a:srgbClr val="C00000"/>
+          </a:solidFill>
+          <a:ln>
+            <a:solidFill>
+              <a:srgbClr val="C00000"/>
+            </a:solidFill>
+          </a:ln>
+        </p:spPr>
+        <p:style>
+          <a:lnRef idx="2">
+            <a:schemeClr val="accent1">
+              <a:shade val="50000"/>
+            </a:schemeClr>
+          </a:lnRef>
+          <a:fillRef idx="1">
+            <a:schemeClr val="accent1"/>
+          </a:fillRef>
+          <a:effectRef idx="0">
+            <a:schemeClr val="accent1"/>
+          </a:effectRef>
+          <a:fontRef idx="minor">
+            <a:schemeClr val="lt1"/>
+          </a:fontRef>
+        </p:style>
+        <p:txBody>
+          <a:bodyPr rtlCol="0" anchor="ctr"/>
+          <a:lstStyle/>
+          <a:p>
+            <a:pPr algn="ctr"/>
+            <a:endParaRPr lang="en-US"/>
+          </a:p>
+        </p:txBody>
+      </p:sp>
+      <p:sp>
+        <p:nvSpPr>
+          <p:cNvPr id="20" name="TextBox 19">
+            <a:extLst>
+              <a:ext uri="{FF2B5EF4-FFF2-40B4-BE49-F238E27FC236}">
+                <a16:creationId xmlns:a16="http://schemas.microsoft.com/office/drawing/2014/main" id="{F06A19E9-DFC7-364B-8DB3-FBA7CC51A5F8}"/>
+              </a:ext>
+            </a:extLst>
+          </p:cNvPr>
+          <p:cNvSpPr txBox="1"/>
+          <p:nvPr/>
+        </p:nvSpPr>
+        <p:spPr>
+          <a:xfrm>
+            <a:off x="281336" y="3519944"/>
+            <a:ext cx="1877123" cy="646331"/>
+          </a:xfrm>
+          <a:prstGeom prst="rect">
+            <a:avLst/>
+          </a:prstGeom>
+          <a:noFill/>
+        </p:spPr>
+        <p:txBody>
+          <a:bodyPr wrap="square" rtlCol="0">
+            <a:spAutoFit/>
+          </a:bodyPr>
+          <a:lstStyle/>
+          <a:p>
+            <a:pPr algn="r"/>
+            <a:r>
+              <a:rPr lang="en-US" dirty="0"/>
+              <a:t>Must have a main commit message</a:t>
+            </a:r>
+          </a:p>
+        </p:txBody>
+      </p:sp>
+      <p:sp>
+        <p:nvSpPr>
+          <p:cNvPr id="21" name="Down Arrow 20">
+            <a:extLst>
+              <a:ext uri="{FF2B5EF4-FFF2-40B4-BE49-F238E27FC236}">
+                <a16:creationId xmlns:a16="http://schemas.microsoft.com/office/drawing/2014/main" id="{96166AE6-39DB-974B-9660-8F437967B4FD}"/>
+              </a:ext>
+            </a:extLst>
+          </p:cNvPr>
+          <p:cNvSpPr/>
+          <p:nvPr/>
+        </p:nvSpPr>
+        <p:spPr>
+          <a:xfrm rot="16200000" flipH="1">
+            <a:off x="2509723" y="4208251"/>
+            <a:ext cx="289931" cy="992459"/>
+          </a:xfrm>
+          <a:prstGeom prst="downArrow">
+            <a:avLst/>
+          </a:prstGeom>
+          <a:solidFill>
+            <a:srgbClr val="C00000"/>
+          </a:solidFill>
+          <a:ln>
+            <a:solidFill>
+              <a:srgbClr val="C00000"/>
+            </a:solidFill>
+          </a:ln>
+        </p:spPr>
+        <p:style>
+          <a:lnRef idx="2">
+            <a:schemeClr val="accent1">
+              <a:shade val="50000"/>
+            </a:schemeClr>
+          </a:lnRef>
+          <a:fillRef idx="1">
+            <a:schemeClr val="accent1"/>
+          </a:fillRef>
+          <a:effectRef idx="0">
+            <a:schemeClr val="accent1"/>
+          </a:effectRef>
+          <a:fontRef idx="minor">
+            <a:schemeClr val="lt1"/>
+          </a:fontRef>
+        </p:style>
+        <p:txBody>
+          <a:bodyPr rtlCol="0" anchor="ctr"/>
+          <a:lstStyle/>
+          <a:p>
+            <a:pPr algn="ctr"/>
+            <a:endParaRPr lang="en-US"/>
+          </a:p>
+        </p:txBody>
+      </p:sp>
+      <p:sp>
+        <p:nvSpPr>
+          <p:cNvPr id="22" name="TextBox 21">
+            <a:extLst>
+              <a:ext uri="{FF2B5EF4-FFF2-40B4-BE49-F238E27FC236}">
+                <a16:creationId xmlns:a16="http://schemas.microsoft.com/office/drawing/2014/main" id="{726FB58D-2DCC-0348-9489-454AB6C1B813}"/>
+              </a:ext>
+            </a:extLst>
+          </p:cNvPr>
+          <p:cNvSpPr txBox="1"/>
+          <p:nvPr/>
+        </p:nvSpPr>
+        <p:spPr>
+          <a:xfrm>
+            <a:off x="281336" y="4414376"/>
+            <a:ext cx="1877123" cy="646331"/>
+          </a:xfrm>
+          <a:prstGeom prst="rect">
+            <a:avLst/>
+          </a:prstGeom>
+          <a:noFill/>
+        </p:spPr>
+        <p:txBody>
+          <a:bodyPr wrap="square" rtlCol="0">
+            <a:spAutoFit/>
+          </a:bodyPr>
+          <a:lstStyle/>
+          <a:p>
+            <a:pPr algn="r"/>
+            <a:r>
+              <a:rPr lang="en-US" dirty="0"/>
+              <a:t>Optional additional details</a:t>
+            </a:r>
+          </a:p>
+        </p:txBody>
+      </p:sp>
+      <p:sp>
+        <p:nvSpPr>
+          <p:cNvPr id="23" name="Down Arrow 22">
+            <a:extLst>
+              <a:ext uri="{FF2B5EF4-FFF2-40B4-BE49-F238E27FC236}">
+                <a16:creationId xmlns:a16="http://schemas.microsoft.com/office/drawing/2014/main" id="{6D049E9E-F4D2-B346-8852-6AEED78658DB}"/>
+              </a:ext>
+            </a:extLst>
+          </p:cNvPr>
+          <p:cNvSpPr/>
+          <p:nvPr/>
+        </p:nvSpPr>
+        <p:spPr>
+          <a:xfrm>
+            <a:off x="9188606" y="1323017"/>
+            <a:ext cx="289931" cy="992459"/>
+          </a:xfrm>
+          <a:prstGeom prst="downArrow">
+            <a:avLst/>
+          </a:prstGeom>
+          <a:solidFill>
+            <a:srgbClr val="C00000"/>
+          </a:solidFill>
+          <a:ln>
+            <a:solidFill>
+              <a:srgbClr val="C00000"/>
+            </a:solidFill>
+          </a:ln>
+        </p:spPr>
+        <p:style>
+          <a:lnRef idx="2">
+            <a:schemeClr val="accent1">
+              <a:shade val="50000"/>
+            </a:schemeClr>
+          </a:lnRef>
+          <a:fillRef idx="1">
+            <a:schemeClr val="accent1"/>
+          </a:fillRef>
+          <a:effectRef idx="0">
+            <a:schemeClr val="accent1"/>
+          </a:effectRef>
+          <a:fontRef idx="minor">
+            <a:schemeClr val="lt1"/>
+          </a:fontRef>
+        </p:style>
+        <p:txBody>
+          <a:bodyPr rtlCol="0" anchor="ctr"/>
+          <a:lstStyle/>
+          <a:p>
+            <a:pPr algn="ctr"/>
+            <a:endParaRPr lang="en-US"/>
+          </a:p>
+        </p:txBody>
+      </p:sp>
+      <p:sp>
+        <p:nvSpPr>
+          <p:cNvPr id="24" name="TextBox 23">
+            <a:extLst>
+              <a:ext uri="{FF2B5EF4-FFF2-40B4-BE49-F238E27FC236}">
+                <a16:creationId xmlns:a16="http://schemas.microsoft.com/office/drawing/2014/main" id="{69932361-6E18-644F-AD86-6200381CC948}"/>
+              </a:ext>
+            </a:extLst>
+          </p:cNvPr>
+          <p:cNvSpPr txBox="1"/>
+          <p:nvPr/>
+        </p:nvSpPr>
+        <p:spPr>
+          <a:xfrm>
+            <a:off x="7559946" y="604411"/>
+            <a:ext cx="3547250" cy="646331"/>
+          </a:xfrm>
+          <a:prstGeom prst="rect">
+            <a:avLst/>
+          </a:prstGeom>
+          <a:noFill/>
+        </p:spPr>
+        <p:txBody>
+          <a:bodyPr wrap="square" rtlCol="0">
+            <a:spAutoFit/>
+          </a:bodyPr>
+          <a:lstStyle/>
+          <a:p>
+            <a:pPr algn="ctr"/>
+            <a:r>
+              <a:rPr lang="en-US" dirty="0"/>
+              <a:t>If it is a text-based file, see line specific changes since last commit</a:t>
+            </a:r>
+          </a:p>
+        </p:txBody>
+      </p:sp>
+      <p:sp>
+        <p:nvSpPr>
+          <p:cNvPr id="25" name="Down Arrow 24">
+            <a:extLst>
+              <a:ext uri="{FF2B5EF4-FFF2-40B4-BE49-F238E27FC236}">
+                <a16:creationId xmlns:a16="http://schemas.microsoft.com/office/drawing/2014/main" id="{99AA1361-4851-4A4C-BDDD-56DF4ECDC2D5}"/>
+              </a:ext>
+            </a:extLst>
+          </p:cNvPr>
+          <p:cNvSpPr/>
+          <p:nvPr/>
+        </p:nvSpPr>
+        <p:spPr>
+          <a:xfrm rot="16200000" flipH="1">
+            <a:off x="2509724" y="5471800"/>
+            <a:ext cx="289931" cy="992459"/>
+          </a:xfrm>
+          <a:prstGeom prst="downArrow">
+            <a:avLst/>
+          </a:prstGeom>
+          <a:solidFill>
+            <a:srgbClr val="C00000"/>
+          </a:solidFill>
+          <a:ln>
+            <a:solidFill>
+              <a:srgbClr val="C00000"/>
+            </a:solidFill>
+          </a:ln>
+        </p:spPr>
+        <p:style>
+          <a:lnRef idx="2">
+            <a:schemeClr val="accent1">
+              <a:shade val="50000"/>
+            </a:schemeClr>
+          </a:lnRef>
+          <a:fillRef idx="1">
+            <a:schemeClr val="accent1"/>
+          </a:fillRef>
+          <a:effectRef idx="0">
+            <a:schemeClr val="accent1"/>
+          </a:effectRef>
+          <a:fontRef idx="minor">
+            <a:schemeClr val="lt1"/>
+          </a:fontRef>
+        </p:style>
+        <p:txBody>
+          <a:bodyPr rtlCol="0" anchor="ctr"/>
+          <a:lstStyle/>
+          <a:p>
+            <a:pPr algn="ctr"/>
+            <a:endParaRPr lang="en-US"/>
+          </a:p>
+        </p:txBody>
+      </p:sp>
+      <p:sp>
+        <p:nvSpPr>
+          <p:cNvPr id="26" name="TextBox 25">
+            <a:extLst>
+              <a:ext uri="{FF2B5EF4-FFF2-40B4-BE49-F238E27FC236}">
+                <a16:creationId xmlns:a16="http://schemas.microsoft.com/office/drawing/2014/main" id="{778B3A43-807A-E742-8509-B54A72D5373C}"/>
+              </a:ext>
+            </a:extLst>
+          </p:cNvPr>
+          <p:cNvSpPr txBox="1"/>
+          <p:nvPr/>
+        </p:nvSpPr>
+        <p:spPr>
+          <a:xfrm>
+            <a:off x="281337" y="5677925"/>
+            <a:ext cx="1877123" cy="646331"/>
+          </a:xfrm>
+          <a:prstGeom prst="rect">
+            <a:avLst/>
+          </a:prstGeom>
+          <a:noFill/>
+        </p:spPr>
+        <p:txBody>
+          <a:bodyPr wrap="square" rtlCol="0">
+            <a:spAutoFit/>
+          </a:bodyPr>
+          <a:lstStyle/>
+          <a:p>
+            <a:pPr algn="r"/>
+            <a:r>
+              <a:rPr lang="en-US" dirty="0"/>
+              <a:t>Most recent commit message</a:t>
+            </a:r>
+          </a:p>
+        </p:txBody>
+      </p:sp>
     </p:spTree>
     <p:extLst>
       <p:ext uri="{BB962C8B-B14F-4D97-AF65-F5344CB8AC3E}">
-        <p14:creationId xmlns:p14="http://schemas.microsoft.com/office/powerpoint/2010/main" val="632464153"/>
+        <p14:creationId xmlns:p14="http://schemas.microsoft.com/office/powerpoint/2010/main" val="2138549737"/>
       </p:ext>
     </p:extLst>
   </p:cSld>
@@ -8208,17 +7534,17 @@
           <a:p>
             <a:r>
               <a:rPr lang="en-US" dirty="0"/>
-              <a:t>Revert back to old versions</a:t>
+              <a:t>Ignore a file</a:t>
             </a:r>
           </a:p>
         </p:txBody>
       </p:sp>
       <p:pic>
         <p:nvPicPr>
-          <p:cNvPr id="6" name="Content Placeholder 5">
-            <a:extLst>
-              <a:ext uri="{FF2B5EF4-FFF2-40B4-BE49-F238E27FC236}">
-                <a16:creationId xmlns:a16="http://schemas.microsoft.com/office/drawing/2014/main" id="{28C092CB-C076-D846-BA94-11966F3BB57A}"/>
+          <p:cNvPr id="9" name="Content Placeholder 8">
+            <a:extLst>
+              <a:ext uri="{FF2B5EF4-FFF2-40B4-BE49-F238E27FC236}">
+                <a16:creationId xmlns:a16="http://schemas.microsoft.com/office/drawing/2014/main" id="{3E50C29C-8026-024F-BF00-58DBBFA906D8}"/>
               </a:ext>
             </a:extLst>
           </p:cNvPr>
@@ -8237,17 +7563,47 @@
         </p:blipFill>
         <p:spPr>
           <a:xfrm>
-            <a:off x="2959100" y="1792424"/>
-            <a:ext cx="6273800" cy="4038600"/>
+            <a:off x="3591467" y="1278537"/>
+            <a:ext cx="5009066" cy="2753988"/>
           </a:xfrm>
         </p:spPr>
       </p:pic>
-      <p:sp>
-        <p:nvSpPr>
-          <p:cNvPr id="7" name="Down Arrow 6">
-            <a:extLst>
-              <a:ext uri="{FF2B5EF4-FFF2-40B4-BE49-F238E27FC236}">
-                <a16:creationId xmlns:a16="http://schemas.microsoft.com/office/drawing/2014/main" id="{CD16FDAC-94E9-E240-AA2D-DFB0E6AF7707}"/>
+      <p:pic>
+        <p:nvPicPr>
+          <p:cNvPr id="11" name="Picture 10">
+            <a:extLst>
+              <a:ext uri="{FF2B5EF4-FFF2-40B4-BE49-F238E27FC236}">
+                <a16:creationId xmlns:a16="http://schemas.microsoft.com/office/drawing/2014/main" id="{1368F551-2FD9-2E4D-8433-8212F1CE6BC4}"/>
+              </a:ext>
+            </a:extLst>
+          </p:cNvPr>
+          <p:cNvPicPr>
+            <a:picLocks noChangeAspect="1"/>
+          </p:cNvPicPr>
+          <p:nvPr/>
+        </p:nvPicPr>
+        <p:blipFill>
+          <a:blip r:embed="rId3"/>
+          <a:stretch>
+            <a:fillRect/>
+          </a:stretch>
+        </p:blipFill>
+        <p:spPr>
+          <a:xfrm>
+            <a:off x="203200" y="4050268"/>
+            <a:ext cx="11785600" cy="2438400"/>
+          </a:xfrm>
+          <a:prstGeom prst="rect">
+            <a:avLst/>
+          </a:prstGeom>
+        </p:spPr>
+      </p:pic>
+      <p:sp>
+        <p:nvSpPr>
+          <p:cNvPr id="12" name="Down Arrow 11">
+            <a:extLst>
+              <a:ext uri="{FF2B5EF4-FFF2-40B4-BE49-F238E27FC236}">
+                <a16:creationId xmlns:a16="http://schemas.microsoft.com/office/drawing/2014/main" id="{6F94056E-64D5-3641-9B76-634887ABE097}"/>
               </a:ext>
             </a:extLst>
           </p:cNvPr>
@@ -8255,8 +7611,8 @@
           <p:nvPr/>
         </p:nvSpPr>
         <p:spPr>
-          <a:xfrm>
-            <a:off x="7515922" y="1355873"/>
+          <a:xfrm rot="5400000">
+            <a:off x="8951797" y="2005207"/>
             <a:ext cx="289931" cy="992459"/>
           </a:xfrm>
           <a:prstGeom prst="downArrow">
@@ -8298,64 +7654,10 @@
       </p:sp>
       <p:sp>
         <p:nvSpPr>
-          <p:cNvPr id="8" name="Down Arrow 7">
-            <a:extLst>
-              <a:ext uri="{FF2B5EF4-FFF2-40B4-BE49-F238E27FC236}">
-                <a16:creationId xmlns:a16="http://schemas.microsoft.com/office/drawing/2014/main" id="{BA1C8CAC-4974-A241-A865-184394AE832D}"/>
-              </a:ext>
-            </a:extLst>
-          </p:cNvPr>
-          <p:cNvSpPr/>
-          <p:nvPr/>
-        </p:nvSpPr>
-        <p:spPr>
-          <a:xfrm rot="5400000">
-            <a:off x="9188605" y="3763429"/>
-            <a:ext cx="289931" cy="992459"/>
-          </a:xfrm>
-          <a:prstGeom prst="downArrow">
-            <a:avLst/>
-          </a:prstGeom>
-          <a:solidFill>
-            <a:srgbClr val="C00000"/>
-          </a:solidFill>
-          <a:ln>
-            <a:solidFill>
-              <a:srgbClr val="C00000"/>
-            </a:solidFill>
-          </a:ln>
-        </p:spPr>
-        <p:style>
-          <a:lnRef idx="2">
-            <a:schemeClr val="accent1">
-              <a:shade val="50000"/>
-            </a:schemeClr>
-          </a:lnRef>
-          <a:fillRef idx="1">
-            <a:schemeClr val="accent1"/>
-          </a:fillRef>
-          <a:effectRef idx="0">
-            <a:schemeClr val="accent1"/>
-          </a:effectRef>
-          <a:fontRef idx="minor">
-            <a:schemeClr val="lt1"/>
-          </a:fontRef>
-        </p:style>
-        <p:txBody>
-          <a:bodyPr rtlCol="0" anchor="ctr"/>
-          <a:lstStyle/>
-          <a:p>
-            <a:pPr algn="ctr"/>
-            <a:endParaRPr lang="en-US"/>
-          </a:p>
-        </p:txBody>
-      </p:sp>
-      <p:sp>
-        <p:nvSpPr>
-          <p:cNvPr id="9" name="TextBox 8">
-            <a:extLst>
-              <a:ext uri="{FF2B5EF4-FFF2-40B4-BE49-F238E27FC236}">
-                <a16:creationId xmlns:a16="http://schemas.microsoft.com/office/drawing/2014/main" id="{EFFADD3C-9347-F04D-BFBC-3487E04B6638}"/>
+          <p:cNvPr id="13" name="TextBox 12">
+            <a:extLst>
+              <a:ext uri="{FF2B5EF4-FFF2-40B4-BE49-F238E27FC236}">
+                <a16:creationId xmlns:a16="http://schemas.microsoft.com/office/drawing/2014/main" id="{6CB90170-46C6-D244-8B68-1E37E320093D}"/>
               </a:ext>
             </a:extLst>
           </p:cNvPr>
@@ -8364,7 +7666,7 @@
         </p:nvSpPr>
         <p:spPr>
           <a:xfrm>
-            <a:off x="9829800" y="4081133"/>
+            <a:off x="9592992" y="2322911"/>
             <a:ext cx="1137234" cy="369332"/>
           </a:xfrm>
           <a:prstGeom prst="rect">
@@ -8388,7 +7690,7 @@
     </p:spTree>
     <p:extLst>
       <p:ext uri="{BB962C8B-B14F-4D97-AF65-F5344CB8AC3E}">
-        <p14:creationId xmlns:p14="http://schemas.microsoft.com/office/powerpoint/2010/main" val="1976229122"/>
+        <p14:creationId xmlns:p14="http://schemas.microsoft.com/office/powerpoint/2010/main" val="4130995991"/>
       </p:ext>
     </p:extLst>
   </p:cSld>

</xml_diff>